<commit_message>
Specification of the allocation algorithm
</commit_message>
<xml_diff>
--- a/Figures/Figure-Sources.pptx
+++ b/Figures/Figure-Sources.pptx
@@ -5,12 +5,13 @@
     <p:sldMasterId id="2147483648" r:id="rId1"/>
   </p:sldMasterIdLst>
   <p:notesMasterIdLst>
-    <p:notesMasterId r:id="rId5"/>
+    <p:notesMasterId r:id="rId6"/>
   </p:notesMasterIdLst>
   <p:sldIdLst>
     <p:sldId id="256" r:id="rId2"/>
-    <p:sldId id="257" r:id="rId3"/>
-    <p:sldId id="258" r:id="rId4"/>
+    <p:sldId id="259" r:id="rId3"/>
+    <p:sldId id="257" r:id="rId4"/>
+    <p:sldId id="258" r:id="rId5"/>
   </p:sldIdLst>
   <p:sldSz cx="12192000" cy="6858000"/>
   <p:notesSz cx="6858000" cy="9144000"/>
@@ -199,7 +200,7 @@
           <a:p>
             <a:fld id="{50E50306-F710-F848-BF66-2AC49711CBBC}" type="datetimeFigureOut">
               <a:rPr lang="en-GB" smtClean="0"/>
-              <a:t>11/07/2018</a:t>
+              <a:t>15/07/2018</a:t>
             </a:fld>
             <a:endParaRPr lang="en-GB"/>
           </a:p>
@@ -598,7 +599,7 @@
           <a:p>
             <a:fld id="{B7B94946-B10A-2B45-BBB3-1C6081FAC149}" type="datetimeFigureOut">
               <a:rPr lang="en-GB" smtClean="0"/>
-              <a:t>11/07/2018</a:t>
+              <a:t>15/07/2018</a:t>
             </a:fld>
             <a:endParaRPr lang="en-GB"/>
           </a:p>
@@ -768,7 +769,7 @@
           <a:p>
             <a:fld id="{B7B94946-B10A-2B45-BBB3-1C6081FAC149}" type="datetimeFigureOut">
               <a:rPr lang="en-GB" smtClean="0"/>
-              <a:t>11/07/2018</a:t>
+              <a:t>15/07/2018</a:t>
             </a:fld>
             <a:endParaRPr lang="en-GB"/>
           </a:p>
@@ -948,7 +949,7 @@
           <a:p>
             <a:fld id="{B7B94946-B10A-2B45-BBB3-1C6081FAC149}" type="datetimeFigureOut">
               <a:rPr lang="en-GB" smtClean="0"/>
-              <a:t>11/07/2018</a:t>
+              <a:t>15/07/2018</a:t>
             </a:fld>
             <a:endParaRPr lang="en-GB"/>
           </a:p>
@@ -1118,7 +1119,7 @@
           <a:p>
             <a:fld id="{B7B94946-B10A-2B45-BBB3-1C6081FAC149}" type="datetimeFigureOut">
               <a:rPr lang="en-GB" smtClean="0"/>
-              <a:t>11/07/2018</a:t>
+              <a:t>15/07/2018</a:t>
             </a:fld>
             <a:endParaRPr lang="en-GB"/>
           </a:p>
@@ -1364,7 +1365,7 @@
           <a:p>
             <a:fld id="{B7B94946-B10A-2B45-BBB3-1C6081FAC149}" type="datetimeFigureOut">
               <a:rPr lang="en-GB" smtClean="0"/>
-              <a:t>11/07/2018</a:t>
+              <a:t>15/07/2018</a:t>
             </a:fld>
             <a:endParaRPr lang="en-GB"/>
           </a:p>
@@ -1596,7 +1597,7 @@
           <a:p>
             <a:fld id="{B7B94946-B10A-2B45-BBB3-1C6081FAC149}" type="datetimeFigureOut">
               <a:rPr lang="en-GB" smtClean="0"/>
-              <a:t>11/07/2018</a:t>
+              <a:t>15/07/2018</a:t>
             </a:fld>
             <a:endParaRPr lang="en-GB"/>
           </a:p>
@@ -1963,7 +1964,7 @@
           <a:p>
             <a:fld id="{B7B94946-B10A-2B45-BBB3-1C6081FAC149}" type="datetimeFigureOut">
               <a:rPr lang="en-GB" smtClean="0"/>
-              <a:t>11/07/2018</a:t>
+              <a:t>15/07/2018</a:t>
             </a:fld>
             <a:endParaRPr lang="en-GB"/>
           </a:p>
@@ -2081,7 +2082,7 @@
           <a:p>
             <a:fld id="{B7B94946-B10A-2B45-BBB3-1C6081FAC149}" type="datetimeFigureOut">
               <a:rPr lang="en-GB" smtClean="0"/>
-              <a:t>11/07/2018</a:t>
+              <a:t>15/07/2018</a:t>
             </a:fld>
             <a:endParaRPr lang="en-GB"/>
           </a:p>
@@ -2176,7 +2177,7 @@
           <a:p>
             <a:fld id="{B7B94946-B10A-2B45-BBB3-1C6081FAC149}" type="datetimeFigureOut">
               <a:rPr lang="en-GB" smtClean="0"/>
-              <a:t>11/07/2018</a:t>
+              <a:t>15/07/2018</a:t>
             </a:fld>
             <a:endParaRPr lang="en-GB"/>
           </a:p>
@@ -2453,7 +2454,7 @@
           <a:p>
             <a:fld id="{B7B94946-B10A-2B45-BBB3-1C6081FAC149}" type="datetimeFigureOut">
               <a:rPr lang="en-GB" smtClean="0"/>
-              <a:t>11/07/2018</a:t>
+              <a:t>15/07/2018</a:t>
             </a:fld>
             <a:endParaRPr lang="en-GB"/>
           </a:p>
@@ -2706,7 +2707,7 @@
           <a:p>
             <a:fld id="{B7B94946-B10A-2B45-BBB3-1C6081FAC149}" type="datetimeFigureOut">
               <a:rPr lang="en-GB" smtClean="0"/>
-              <a:t>11/07/2018</a:t>
+              <a:t>15/07/2018</a:t>
             </a:fld>
             <a:endParaRPr lang="en-GB"/>
           </a:p>
@@ -2919,7 +2920,7 @@
           <a:p>
             <a:fld id="{B7B94946-B10A-2B45-BBB3-1C6081FAC149}" type="datetimeFigureOut">
               <a:rPr lang="en-GB" smtClean="0"/>
-              <a:t>11/07/2018</a:t>
+              <a:t>15/07/2018</a:t>
             </a:fld>
             <a:endParaRPr lang="en-GB"/>
           </a:p>
@@ -4205,6 +4206,923 @@
 </file>
 
 <file path=ppt/slides/slide2.xml><?xml version="1.0" encoding="utf-8"?>
+<p:sld xmlns:a="http://schemas.openxmlformats.org/drawingml/2006/main" xmlns:r="http://schemas.openxmlformats.org/officeDocument/2006/relationships" xmlns:p="http://schemas.openxmlformats.org/presentationml/2006/main">
+  <p:cSld>
+    <p:spTree>
+      <p:nvGrpSpPr>
+        <p:cNvPr id="1" name=""/>
+        <p:cNvGrpSpPr/>
+        <p:nvPr/>
+      </p:nvGrpSpPr>
+      <p:grpSpPr>
+        <a:xfrm>
+          <a:off x="0" y="0"/>
+          <a:ext cx="0" cy="0"/>
+          <a:chOff x="0" y="0"/>
+          <a:chExt cx="0" cy="0"/>
+        </a:xfrm>
+      </p:grpSpPr>
+      <p:cxnSp>
+        <p:nvCxnSpPr>
+          <p:cNvPr id="3" name="Straight Arrow Connector 2">
+            <a:extLst>
+              <a:ext uri="{FF2B5EF4-FFF2-40B4-BE49-F238E27FC236}">
+                <a16:creationId xmlns:a16="http://schemas.microsoft.com/office/drawing/2014/main" id="{A96A5D74-2EF6-BE4E-9E37-89ED3C58D28D}"/>
+              </a:ext>
+            </a:extLst>
+          </p:cNvPr>
+          <p:cNvCxnSpPr/>
+          <p:nvPr/>
+        </p:nvCxnSpPr>
+        <p:spPr>
+          <a:xfrm>
+            <a:off x="1928814" y="4429125"/>
+            <a:ext cx="5686425" cy="0"/>
+          </a:xfrm>
+          <a:prstGeom prst="straightConnector1">
+            <a:avLst/>
+          </a:prstGeom>
+          <a:ln w="38100">
+            <a:solidFill>
+              <a:schemeClr val="tx1"/>
+            </a:solidFill>
+            <a:tailEnd type="triangle"/>
+          </a:ln>
+        </p:spPr>
+        <p:style>
+          <a:lnRef idx="1">
+            <a:schemeClr val="accent1"/>
+          </a:lnRef>
+          <a:fillRef idx="0">
+            <a:schemeClr val="accent1"/>
+          </a:fillRef>
+          <a:effectRef idx="0">
+            <a:schemeClr val="accent1"/>
+          </a:effectRef>
+          <a:fontRef idx="minor">
+            <a:schemeClr val="tx1"/>
+          </a:fontRef>
+        </p:style>
+      </p:cxnSp>
+      <p:cxnSp>
+        <p:nvCxnSpPr>
+          <p:cNvPr id="4" name="Straight Arrow Connector 3">
+            <a:extLst>
+              <a:ext uri="{FF2B5EF4-FFF2-40B4-BE49-F238E27FC236}">
+                <a16:creationId xmlns:a16="http://schemas.microsoft.com/office/drawing/2014/main" id="{F5567669-A9F3-DE4F-9985-8284FC236BD0}"/>
+              </a:ext>
+            </a:extLst>
+          </p:cNvPr>
+          <p:cNvCxnSpPr>
+            <a:cxnSpLocks/>
+          </p:cNvCxnSpPr>
+          <p:nvPr/>
+        </p:nvCxnSpPr>
+        <p:spPr>
+          <a:xfrm flipV="1">
+            <a:off x="1928814" y="1271588"/>
+            <a:ext cx="0" cy="3171825"/>
+          </a:xfrm>
+          <a:prstGeom prst="straightConnector1">
+            <a:avLst/>
+          </a:prstGeom>
+          <a:ln w="38100">
+            <a:solidFill>
+              <a:schemeClr val="tx1"/>
+            </a:solidFill>
+            <a:tailEnd type="triangle"/>
+          </a:ln>
+        </p:spPr>
+        <p:style>
+          <a:lnRef idx="1">
+            <a:schemeClr val="accent1"/>
+          </a:lnRef>
+          <a:fillRef idx="0">
+            <a:schemeClr val="accent1"/>
+          </a:fillRef>
+          <a:effectRef idx="0">
+            <a:schemeClr val="accent1"/>
+          </a:effectRef>
+          <a:fontRef idx="minor">
+            <a:schemeClr val="tx1"/>
+          </a:fontRef>
+        </p:style>
+      </p:cxnSp>
+      <p:sp>
+        <p:nvSpPr>
+          <p:cNvPr id="7" name="TextBox 6">
+            <a:extLst>
+              <a:ext uri="{FF2B5EF4-FFF2-40B4-BE49-F238E27FC236}">
+                <a16:creationId xmlns:a16="http://schemas.microsoft.com/office/drawing/2014/main" id="{D5F2E2D7-995D-0249-8D18-53E51484C47E}"/>
+              </a:ext>
+            </a:extLst>
+          </p:cNvPr>
+          <p:cNvSpPr txBox="1"/>
+          <p:nvPr/>
+        </p:nvSpPr>
+        <p:spPr>
+          <a:xfrm>
+            <a:off x="626502" y="1428751"/>
+            <a:ext cx="1197444" cy="1015663"/>
+          </a:xfrm>
+          <a:prstGeom prst="rect">
+            <a:avLst/>
+          </a:prstGeom>
+          <a:noFill/>
+        </p:spPr>
+        <p:txBody>
+          <a:bodyPr wrap="none" rtlCol="0">
+            <a:spAutoFit/>
+          </a:bodyPr>
+          <a:lstStyle/>
+          <a:p>
+            <a:pPr algn="ctr"/>
+            <a:r>
+              <a:rPr lang="en-GB" dirty="0"/>
+              <a:t>CPU Usage</a:t>
+            </a:r>
+          </a:p>
+          <a:p>
+            <a:pPr algn="ctr"/>
+            <a:r>
+              <a:rPr lang="en-GB" sz="1400" dirty="0"/>
+              <a:t>(</a:t>
+            </a:r>
+            <a:r>
+              <a:rPr lang="en-GB" sz="1400" dirty="0" err="1"/>
+              <a:t>total_usage</a:t>
+            </a:r>
+            <a:r>
+              <a:rPr lang="en-GB" sz="1400" dirty="0"/>
+              <a:t>,</a:t>
+            </a:r>
+            <a:br>
+              <a:rPr lang="en-GB" sz="1400" dirty="0"/>
+            </a:br>
+            <a:r>
+              <a:rPr lang="en-GB" sz="1400" dirty="0" err="1"/>
+              <a:t>msec</a:t>
+            </a:r>
+            <a:r>
+              <a:rPr lang="en-GB" sz="1400" dirty="0"/>
+              <a:t>,</a:t>
+            </a:r>
+            <a:br>
+              <a:rPr lang="en-GB" sz="1400" dirty="0"/>
+            </a:br>
+            <a:r>
+              <a:rPr lang="en-GB" sz="1400" dirty="0"/>
+              <a:t>cumulative)</a:t>
+            </a:r>
+          </a:p>
+        </p:txBody>
+      </p:sp>
+      <p:cxnSp>
+        <p:nvCxnSpPr>
+          <p:cNvPr id="9" name="Straight Connector 8">
+            <a:extLst>
+              <a:ext uri="{FF2B5EF4-FFF2-40B4-BE49-F238E27FC236}">
+                <a16:creationId xmlns:a16="http://schemas.microsoft.com/office/drawing/2014/main" id="{445E83D4-B9AB-0947-963E-0B878A54A0D9}"/>
+              </a:ext>
+            </a:extLst>
+          </p:cNvPr>
+          <p:cNvCxnSpPr>
+            <a:cxnSpLocks/>
+          </p:cNvCxnSpPr>
+          <p:nvPr/>
+        </p:nvCxnSpPr>
+        <p:spPr>
+          <a:xfrm flipV="1">
+            <a:off x="2771775" y="1243012"/>
+            <a:ext cx="0" cy="3171825"/>
+          </a:xfrm>
+          <a:prstGeom prst="line">
+            <a:avLst/>
+          </a:prstGeom>
+          <a:ln w="19050">
+            <a:solidFill>
+              <a:schemeClr val="tx1"/>
+            </a:solidFill>
+            <a:prstDash val="dash"/>
+          </a:ln>
+        </p:spPr>
+        <p:style>
+          <a:lnRef idx="1">
+            <a:schemeClr val="accent1"/>
+          </a:lnRef>
+          <a:fillRef idx="0">
+            <a:schemeClr val="accent1"/>
+          </a:fillRef>
+          <a:effectRef idx="0">
+            <a:schemeClr val="accent1"/>
+          </a:effectRef>
+          <a:fontRef idx="minor">
+            <a:schemeClr val="tx1"/>
+          </a:fontRef>
+        </p:style>
+      </p:cxnSp>
+      <p:cxnSp>
+        <p:nvCxnSpPr>
+          <p:cNvPr id="11" name="Straight Connector 10">
+            <a:extLst>
+              <a:ext uri="{FF2B5EF4-FFF2-40B4-BE49-F238E27FC236}">
+                <a16:creationId xmlns:a16="http://schemas.microsoft.com/office/drawing/2014/main" id="{8B84FF9D-BA53-4D43-9EC6-610208880BD3}"/>
+              </a:ext>
+            </a:extLst>
+          </p:cNvPr>
+          <p:cNvCxnSpPr>
+            <a:cxnSpLocks/>
+          </p:cNvCxnSpPr>
+          <p:nvPr/>
+        </p:nvCxnSpPr>
+        <p:spPr>
+          <a:xfrm flipV="1">
+            <a:off x="4450557" y="1243012"/>
+            <a:ext cx="0" cy="3171825"/>
+          </a:xfrm>
+          <a:prstGeom prst="line">
+            <a:avLst/>
+          </a:prstGeom>
+          <a:ln w="19050">
+            <a:solidFill>
+              <a:schemeClr val="tx1"/>
+            </a:solidFill>
+            <a:prstDash val="dash"/>
+          </a:ln>
+        </p:spPr>
+        <p:style>
+          <a:lnRef idx="1">
+            <a:schemeClr val="accent1"/>
+          </a:lnRef>
+          <a:fillRef idx="0">
+            <a:schemeClr val="accent1"/>
+          </a:fillRef>
+          <a:effectRef idx="0">
+            <a:schemeClr val="accent1"/>
+          </a:effectRef>
+          <a:fontRef idx="minor">
+            <a:schemeClr val="tx1"/>
+          </a:fontRef>
+        </p:style>
+      </p:cxnSp>
+      <p:cxnSp>
+        <p:nvCxnSpPr>
+          <p:cNvPr id="12" name="Straight Connector 11">
+            <a:extLst>
+              <a:ext uri="{FF2B5EF4-FFF2-40B4-BE49-F238E27FC236}">
+                <a16:creationId xmlns:a16="http://schemas.microsoft.com/office/drawing/2014/main" id="{14D246CF-1817-D747-979D-29841629B8DD}"/>
+              </a:ext>
+            </a:extLst>
+          </p:cNvPr>
+          <p:cNvCxnSpPr>
+            <a:cxnSpLocks/>
+          </p:cNvCxnSpPr>
+          <p:nvPr/>
+        </p:nvCxnSpPr>
+        <p:spPr>
+          <a:xfrm flipV="1">
+            <a:off x="6129338" y="1243012"/>
+            <a:ext cx="0" cy="3171825"/>
+          </a:xfrm>
+          <a:prstGeom prst="line">
+            <a:avLst/>
+          </a:prstGeom>
+          <a:ln w="19050">
+            <a:solidFill>
+              <a:schemeClr val="tx1"/>
+            </a:solidFill>
+            <a:prstDash val="dash"/>
+          </a:ln>
+        </p:spPr>
+        <p:style>
+          <a:lnRef idx="1">
+            <a:schemeClr val="accent1"/>
+          </a:lnRef>
+          <a:fillRef idx="0">
+            <a:schemeClr val="accent1"/>
+          </a:fillRef>
+          <a:effectRef idx="0">
+            <a:schemeClr val="accent1"/>
+          </a:effectRef>
+          <a:fontRef idx="minor">
+            <a:schemeClr val="tx1"/>
+          </a:fontRef>
+        </p:style>
+      </p:cxnSp>
+      <p:sp>
+        <p:nvSpPr>
+          <p:cNvPr id="13" name="TextBox 12">
+            <a:extLst>
+              <a:ext uri="{FF2B5EF4-FFF2-40B4-BE49-F238E27FC236}">
+                <a16:creationId xmlns:a16="http://schemas.microsoft.com/office/drawing/2014/main" id="{56C8A305-98A4-4C42-98AB-A489E21B7623}"/>
+              </a:ext>
+            </a:extLst>
+          </p:cNvPr>
+          <p:cNvSpPr txBox="1"/>
+          <p:nvPr/>
+        </p:nvSpPr>
+        <p:spPr>
+          <a:xfrm>
+            <a:off x="2601696" y="4600039"/>
+            <a:ext cx="340158" cy="369332"/>
+          </a:xfrm>
+          <a:prstGeom prst="rect">
+            <a:avLst/>
+          </a:prstGeom>
+          <a:noFill/>
+        </p:spPr>
+        <p:txBody>
+          <a:bodyPr wrap="none" rtlCol="0">
+            <a:spAutoFit/>
+          </a:bodyPr>
+          <a:lstStyle/>
+          <a:p>
+            <a:r>
+              <a:rPr lang="en-GB" dirty="0"/>
+              <a:t>t</a:t>
+            </a:r>
+            <a:r>
+              <a:rPr lang="en-GB" baseline="-25000" dirty="0"/>
+              <a:t>1</a:t>
+            </a:r>
+          </a:p>
+        </p:txBody>
+      </p:sp>
+      <p:sp>
+        <p:nvSpPr>
+          <p:cNvPr id="14" name="TextBox 13">
+            <a:extLst>
+              <a:ext uri="{FF2B5EF4-FFF2-40B4-BE49-F238E27FC236}">
+                <a16:creationId xmlns:a16="http://schemas.microsoft.com/office/drawing/2014/main" id="{0D3656AD-21C2-C343-877D-FD4A1ED43B40}"/>
+              </a:ext>
+            </a:extLst>
+          </p:cNvPr>
+          <p:cNvSpPr txBox="1"/>
+          <p:nvPr/>
+        </p:nvSpPr>
+        <p:spPr>
+          <a:xfrm>
+            <a:off x="4280478" y="4600039"/>
+            <a:ext cx="340158" cy="369332"/>
+          </a:xfrm>
+          <a:prstGeom prst="rect">
+            <a:avLst/>
+          </a:prstGeom>
+          <a:noFill/>
+        </p:spPr>
+        <p:txBody>
+          <a:bodyPr wrap="none" rtlCol="0">
+            <a:spAutoFit/>
+          </a:bodyPr>
+          <a:lstStyle/>
+          <a:p>
+            <a:r>
+              <a:rPr lang="en-GB" dirty="0"/>
+              <a:t>t</a:t>
+            </a:r>
+            <a:r>
+              <a:rPr lang="en-GB" baseline="-25000" dirty="0"/>
+              <a:t>2</a:t>
+            </a:r>
+          </a:p>
+        </p:txBody>
+      </p:sp>
+      <p:sp>
+        <p:nvSpPr>
+          <p:cNvPr id="15" name="TextBox 14">
+            <a:extLst>
+              <a:ext uri="{FF2B5EF4-FFF2-40B4-BE49-F238E27FC236}">
+                <a16:creationId xmlns:a16="http://schemas.microsoft.com/office/drawing/2014/main" id="{73CFB907-FF0D-B546-9EEA-7823D150CA73}"/>
+              </a:ext>
+            </a:extLst>
+          </p:cNvPr>
+          <p:cNvSpPr txBox="1"/>
+          <p:nvPr/>
+        </p:nvSpPr>
+        <p:spPr>
+          <a:xfrm>
+            <a:off x="5959259" y="4600039"/>
+            <a:ext cx="340158" cy="369332"/>
+          </a:xfrm>
+          <a:prstGeom prst="rect">
+            <a:avLst/>
+          </a:prstGeom>
+          <a:noFill/>
+        </p:spPr>
+        <p:txBody>
+          <a:bodyPr wrap="none" rtlCol="0">
+            <a:spAutoFit/>
+          </a:bodyPr>
+          <a:lstStyle/>
+          <a:p>
+            <a:r>
+              <a:rPr lang="en-GB" dirty="0"/>
+              <a:t>t</a:t>
+            </a:r>
+            <a:r>
+              <a:rPr lang="en-GB" baseline="-25000" dirty="0"/>
+              <a:t>3</a:t>
+            </a:r>
+          </a:p>
+        </p:txBody>
+      </p:sp>
+      <p:cxnSp>
+        <p:nvCxnSpPr>
+          <p:cNvPr id="18" name="Straight Connector 17">
+            <a:extLst>
+              <a:ext uri="{FF2B5EF4-FFF2-40B4-BE49-F238E27FC236}">
+                <a16:creationId xmlns:a16="http://schemas.microsoft.com/office/drawing/2014/main" id="{7B1AE656-8FBF-5044-BF31-3E4EEB23FBC1}"/>
+              </a:ext>
+            </a:extLst>
+          </p:cNvPr>
+          <p:cNvCxnSpPr/>
+          <p:nvPr/>
+        </p:nvCxnSpPr>
+        <p:spPr>
+          <a:xfrm flipV="1">
+            <a:off x="1928814" y="3400425"/>
+            <a:ext cx="1400174" cy="328613"/>
+          </a:xfrm>
+          <a:prstGeom prst="line">
+            <a:avLst/>
+          </a:prstGeom>
+          <a:ln w="28575">
+            <a:solidFill>
+              <a:schemeClr val="tx1"/>
+            </a:solidFill>
+            <a:bevel/>
+          </a:ln>
+        </p:spPr>
+        <p:style>
+          <a:lnRef idx="1">
+            <a:schemeClr val="accent1"/>
+          </a:lnRef>
+          <a:fillRef idx="0">
+            <a:schemeClr val="accent1"/>
+          </a:fillRef>
+          <a:effectRef idx="0">
+            <a:schemeClr val="accent1"/>
+          </a:effectRef>
+          <a:fontRef idx="minor">
+            <a:schemeClr val="tx1"/>
+          </a:fontRef>
+        </p:style>
+      </p:cxnSp>
+      <p:cxnSp>
+        <p:nvCxnSpPr>
+          <p:cNvPr id="19" name="Straight Connector 18">
+            <a:extLst>
+              <a:ext uri="{FF2B5EF4-FFF2-40B4-BE49-F238E27FC236}">
+                <a16:creationId xmlns:a16="http://schemas.microsoft.com/office/drawing/2014/main" id="{B0710199-1668-0A4B-AD67-7C1B32499F0B}"/>
+              </a:ext>
+            </a:extLst>
+          </p:cNvPr>
+          <p:cNvCxnSpPr>
+            <a:cxnSpLocks/>
+          </p:cNvCxnSpPr>
+          <p:nvPr/>
+        </p:nvCxnSpPr>
+        <p:spPr>
+          <a:xfrm flipV="1">
+            <a:off x="3328988" y="3014663"/>
+            <a:ext cx="285748" cy="385764"/>
+          </a:xfrm>
+          <a:prstGeom prst="line">
+            <a:avLst/>
+          </a:prstGeom>
+          <a:ln w="28575" cap="rnd">
+            <a:solidFill>
+              <a:schemeClr val="tx1"/>
+            </a:solidFill>
+            <a:round/>
+          </a:ln>
+        </p:spPr>
+        <p:style>
+          <a:lnRef idx="1">
+            <a:schemeClr val="accent1"/>
+          </a:lnRef>
+          <a:fillRef idx="0">
+            <a:schemeClr val="accent1"/>
+          </a:fillRef>
+          <a:effectRef idx="0">
+            <a:schemeClr val="accent1"/>
+          </a:effectRef>
+          <a:fontRef idx="minor">
+            <a:schemeClr val="tx1"/>
+          </a:fontRef>
+        </p:style>
+      </p:cxnSp>
+      <p:cxnSp>
+        <p:nvCxnSpPr>
+          <p:cNvPr id="21" name="Straight Connector 20">
+            <a:extLst>
+              <a:ext uri="{FF2B5EF4-FFF2-40B4-BE49-F238E27FC236}">
+                <a16:creationId xmlns:a16="http://schemas.microsoft.com/office/drawing/2014/main" id="{5795E63B-5941-1D48-97F5-C35190DF690E}"/>
+              </a:ext>
+            </a:extLst>
+          </p:cNvPr>
+          <p:cNvCxnSpPr>
+            <a:cxnSpLocks/>
+          </p:cNvCxnSpPr>
+          <p:nvPr/>
+        </p:nvCxnSpPr>
+        <p:spPr>
+          <a:xfrm flipV="1">
+            <a:off x="3614736" y="2114550"/>
+            <a:ext cx="2344523" cy="900113"/>
+          </a:xfrm>
+          <a:prstGeom prst="line">
+            <a:avLst/>
+          </a:prstGeom>
+          <a:ln w="28575" cap="rnd">
+            <a:solidFill>
+              <a:schemeClr val="tx1"/>
+            </a:solidFill>
+            <a:round/>
+          </a:ln>
+        </p:spPr>
+        <p:style>
+          <a:lnRef idx="1">
+            <a:schemeClr val="accent1"/>
+          </a:lnRef>
+          <a:fillRef idx="0">
+            <a:schemeClr val="accent1"/>
+          </a:fillRef>
+          <a:effectRef idx="0">
+            <a:schemeClr val="accent1"/>
+          </a:effectRef>
+          <a:fontRef idx="minor">
+            <a:schemeClr val="tx1"/>
+          </a:fontRef>
+        </p:style>
+      </p:cxnSp>
+      <p:cxnSp>
+        <p:nvCxnSpPr>
+          <p:cNvPr id="25" name="Straight Connector 24">
+            <a:extLst>
+              <a:ext uri="{FF2B5EF4-FFF2-40B4-BE49-F238E27FC236}">
+                <a16:creationId xmlns:a16="http://schemas.microsoft.com/office/drawing/2014/main" id="{A1C3F9C5-AC1F-3F49-98D4-D7D461A432C7}"/>
+              </a:ext>
+            </a:extLst>
+          </p:cNvPr>
+          <p:cNvCxnSpPr>
+            <a:cxnSpLocks/>
+          </p:cNvCxnSpPr>
+          <p:nvPr/>
+        </p:nvCxnSpPr>
+        <p:spPr>
+          <a:xfrm flipV="1">
+            <a:off x="5966404" y="2114550"/>
+            <a:ext cx="434396" cy="1"/>
+          </a:xfrm>
+          <a:prstGeom prst="line">
+            <a:avLst/>
+          </a:prstGeom>
+          <a:ln w="28575" cap="rnd">
+            <a:solidFill>
+              <a:schemeClr val="tx1"/>
+            </a:solidFill>
+            <a:round/>
+          </a:ln>
+        </p:spPr>
+        <p:style>
+          <a:lnRef idx="1">
+            <a:schemeClr val="accent1"/>
+          </a:lnRef>
+          <a:fillRef idx="0">
+            <a:schemeClr val="accent1"/>
+          </a:fillRef>
+          <a:effectRef idx="0">
+            <a:schemeClr val="accent1"/>
+          </a:effectRef>
+          <a:fontRef idx="minor">
+            <a:schemeClr val="tx1"/>
+          </a:fontRef>
+        </p:style>
+      </p:cxnSp>
+      <p:sp>
+        <p:nvSpPr>
+          <p:cNvPr id="30" name="Oval 29">
+            <a:extLst>
+              <a:ext uri="{FF2B5EF4-FFF2-40B4-BE49-F238E27FC236}">
+                <a16:creationId xmlns:a16="http://schemas.microsoft.com/office/drawing/2014/main" id="{11B51B8E-CE4A-D940-9423-73F4A3C521F5}"/>
+              </a:ext>
+            </a:extLst>
+          </p:cNvPr>
+          <p:cNvSpPr>
+            <a:spLocks noChangeAspect="1"/>
+          </p:cNvSpPr>
+          <p:nvPr/>
+        </p:nvSpPr>
+        <p:spPr>
+          <a:xfrm>
+            <a:off x="3795075" y="2862584"/>
+            <a:ext cx="108000" cy="108000"/>
+          </a:xfrm>
+          <a:prstGeom prst="ellipse">
+            <a:avLst/>
+          </a:prstGeom>
+          <a:solidFill>
+            <a:schemeClr val="tx1"/>
+          </a:solidFill>
+          <a:ln>
+            <a:solidFill>
+              <a:schemeClr val="tx1"/>
+            </a:solidFill>
+          </a:ln>
+        </p:spPr>
+        <p:style>
+          <a:lnRef idx="2">
+            <a:schemeClr val="accent1">
+              <a:shade val="50000"/>
+            </a:schemeClr>
+          </a:lnRef>
+          <a:fillRef idx="1">
+            <a:schemeClr val="accent1"/>
+          </a:fillRef>
+          <a:effectRef idx="0">
+            <a:schemeClr val="accent1"/>
+          </a:effectRef>
+          <a:fontRef idx="minor">
+            <a:schemeClr val="lt1"/>
+          </a:fontRef>
+        </p:style>
+        <p:txBody>
+          <a:bodyPr rtlCol="0" anchor="ctr"/>
+          <a:lstStyle/>
+          <a:p>
+            <a:pPr algn="ctr"/>
+            <a:endParaRPr lang="en-GB"/>
+          </a:p>
+        </p:txBody>
+      </p:sp>
+      <p:sp>
+        <p:nvSpPr>
+          <p:cNvPr id="31" name="Oval 30">
+            <a:extLst>
+              <a:ext uri="{FF2B5EF4-FFF2-40B4-BE49-F238E27FC236}">
+                <a16:creationId xmlns:a16="http://schemas.microsoft.com/office/drawing/2014/main" id="{E9AB1F36-FA54-784C-9F95-22292E674014}"/>
+              </a:ext>
+            </a:extLst>
+          </p:cNvPr>
+          <p:cNvSpPr>
+            <a:spLocks noChangeAspect="1"/>
+          </p:cNvSpPr>
+          <p:nvPr/>
+        </p:nvSpPr>
+        <p:spPr>
+          <a:xfrm>
+            <a:off x="5113303" y="2353889"/>
+            <a:ext cx="108000" cy="108000"/>
+          </a:xfrm>
+          <a:prstGeom prst="ellipse">
+            <a:avLst/>
+          </a:prstGeom>
+          <a:solidFill>
+            <a:schemeClr val="tx1"/>
+          </a:solidFill>
+          <a:ln>
+            <a:solidFill>
+              <a:schemeClr val="tx1"/>
+            </a:solidFill>
+          </a:ln>
+        </p:spPr>
+        <p:style>
+          <a:lnRef idx="2">
+            <a:schemeClr val="accent1">
+              <a:shade val="50000"/>
+            </a:schemeClr>
+          </a:lnRef>
+          <a:fillRef idx="1">
+            <a:schemeClr val="accent1"/>
+          </a:fillRef>
+          <a:effectRef idx="0">
+            <a:schemeClr val="accent1"/>
+          </a:effectRef>
+          <a:fontRef idx="minor">
+            <a:schemeClr val="lt1"/>
+          </a:fontRef>
+        </p:style>
+        <p:txBody>
+          <a:bodyPr rtlCol="0" anchor="ctr"/>
+          <a:lstStyle/>
+          <a:p>
+            <a:pPr algn="ctr"/>
+            <a:endParaRPr lang="en-GB"/>
+          </a:p>
+        </p:txBody>
+      </p:sp>
+      <p:cxnSp>
+        <p:nvCxnSpPr>
+          <p:cNvPr id="33" name="Straight Connector 32">
+            <a:extLst>
+              <a:ext uri="{FF2B5EF4-FFF2-40B4-BE49-F238E27FC236}">
+                <a16:creationId xmlns:a16="http://schemas.microsoft.com/office/drawing/2014/main" id="{D2698013-A6A3-9A44-91C9-15E2FBDA589D}"/>
+              </a:ext>
+            </a:extLst>
+          </p:cNvPr>
+          <p:cNvCxnSpPr>
+            <a:cxnSpLocks/>
+          </p:cNvCxnSpPr>
+          <p:nvPr/>
+        </p:nvCxnSpPr>
+        <p:spPr>
+          <a:xfrm flipV="1">
+            <a:off x="3849075" y="3014664"/>
+            <a:ext cx="0" cy="1428749"/>
+          </a:xfrm>
+          <a:prstGeom prst="line">
+            <a:avLst/>
+          </a:prstGeom>
+          <a:ln w="19050">
+            <a:solidFill>
+              <a:schemeClr val="tx1"/>
+            </a:solidFill>
+            <a:prstDash val="dash"/>
+          </a:ln>
+        </p:spPr>
+        <p:style>
+          <a:lnRef idx="1">
+            <a:schemeClr val="accent1"/>
+          </a:lnRef>
+          <a:fillRef idx="0">
+            <a:schemeClr val="accent1"/>
+          </a:fillRef>
+          <a:effectRef idx="0">
+            <a:schemeClr val="accent1"/>
+          </a:effectRef>
+          <a:fontRef idx="minor">
+            <a:schemeClr val="tx1"/>
+          </a:fontRef>
+        </p:style>
+      </p:cxnSp>
+      <p:sp>
+        <p:nvSpPr>
+          <p:cNvPr id="35" name="TextBox 34">
+            <a:extLst>
+              <a:ext uri="{FF2B5EF4-FFF2-40B4-BE49-F238E27FC236}">
+                <a16:creationId xmlns:a16="http://schemas.microsoft.com/office/drawing/2014/main" id="{DB05FB56-8EFC-6540-8ABD-ED2A19D671CC}"/>
+              </a:ext>
+            </a:extLst>
+          </p:cNvPr>
+          <p:cNvSpPr txBox="1"/>
+          <p:nvPr/>
+        </p:nvSpPr>
+        <p:spPr>
+          <a:xfrm>
+            <a:off x="3626861" y="4600039"/>
+            <a:ext cx="444429" cy="369332"/>
+          </a:xfrm>
+          <a:prstGeom prst="rect">
+            <a:avLst/>
+          </a:prstGeom>
+          <a:noFill/>
+        </p:spPr>
+        <p:txBody>
+          <a:bodyPr wrap="square" rtlCol="0">
+            <a:spAutoFit/>
+          </a:bodyPr>
+          <a:lstStyle/>
+          <a:p>
+            <a:pPr algn="ctr"/>
+            <a:r>
+              <a:rPr lang="en-GB" dirty="0" err="1"/>
+              <a:t>st</a:t>
+            </a:r>
+            <a:endParaRPr lang="en-GB" baseline="-25000" dirty="0"/>
+          </a:p>
+        </p:txBody>
+      </p:sp>
+      <p:sp>
+        <p:nvSpPr>
+          <p:cNvPr id="36" name="TextBox 35">
+            <a:extLst>
+              <a:ext uri="{FF2B5EF4-FFF2-40B4-BE49-F238E27FC236}">
+                <a16:creationId xmlns:a16="http://schemas.microsoft.com/office/drawing/2014/main" id="{57114DA5-EB3E-8A4E-9F35-B92C5343535F}"/>
+              </a:ext>
+            </a:extLst>
+          </p:cNvPr>
+          <p:cNvSpPr txBox="1"/>
+          <p:nvPr/>
+        </p:nvSpPr>
+        <p:spPr>
+          <a:xfrm>
+            <a:off x="4945089" y="4600039"/>
+            <a:ext cx="444429" cy="369332"/>
+          </a:xfrm>
+          <a:prstGeom prst="rect">
+            <a:avLst/>
+          </a:prstGeom>
+          <a:noFill/>
+        </p:spPr>
+        <p:txBody>
+          <a:bodyPr wrap="square" rtlCol="0">
+            <a:spAutoFit/>
+          </a:bodyPr>
+          <a:lstStyle/>
+          <a:p>
+            <a:pPr algn="ctr"/>
+            <a:r>
+              <a:rPr lang="en-GB" dirty="0"/>
+              <a:t>et</a:t>
+            </a:r>
+            <a:endParaRPr lang="en-GB" baseline="-25000" dirty="0"/>
+          </a:p>
+        </p:txBody>
+      </p:sp>
+      <p:cxnSp>
+        <p:nvCxnSpPr>
+          <p:cNvPr id="37" name="Straight Connector 36">
+            <a:extLst>
+              <a:ext uri="{FF2B5EF4-FFF2-40B4-BE49-F238E27FC236}">
+                <a16:creationId xmlns:a16="http://schemas.microsoft.com/office/drawing/2014/main" id="{79F69888-3FAA-2E49-A2A1-514D89813333}"/>
+              </a:ext>
+            </a:extLst>
+          </p:cNvPr>
+          <p:cNvCxnSpPr>
+            <a:cxnSpLocks/>
+          </p:cNvCxnSpPr>
+          <p:nvPr/>
+        </p:nvCxnSpPr>
+        <p:spPr>
+          <a:xfrm flipV="1">
+            <a:off x="5167303" y="2493171"/>
+            <a:ext cx="0" cy="1921666"/>
+          </a:xfrm>
+          <a:prstGeom prst="line">
+            <a:avLst/>
+          </a:prstGeom>
+          <a:ln w="19050">
+            <a:solidFill>
+              <a:schemeClr val="tx1"/>
+            </a:solidFill>
+            <a:prstDash val="dash"/>
+          </a:ln>
+        </p:spPr>
+        <p:style>
+          <a:lnRef idx="1">
+            <a:schemeClr val="accent1"/>
+          </a:lnRef>
+          <a:fillRef idx="0">
+            <a:schemeClr val="accent1"/>
+          </a:fillRef>
+          <a:effectRef idx="0">
+            <a:schemeClr val="accent1"/>
+          </a:effectRef>
+          <a:fontRef idx="minor">
+            <a:schemeClr val="tx1"/>
+          </a:fontRef>
+        </p:style>
+      </p:cxnSp>
+      <p:sp>
+        <p:nvSpPr>
+          <p:cNvPr id="39" name="TextBox 38">
+            <a:extLst>
+              <a:ext uri="{FF2B5EF4-FFF2-40B4-BE49-F238E27FC236}">
+                <a16:creationId xmlns:a16="http://schemas.microsoft.com/office/drawing/2014/main" id="{647536FB-CF22-7A47-98DC-68CDDD2A35FE}"/>
+              </a:ext>
+            </a:extLst>
+          </p:cNvPr>
+          <p:cNvSpPr txBox="1"/>
+          <p:nvPr/>
+        </p:nvSpPr>
+        <p:spPr>
+          <a:xfrm>
+            <a:off x="6965702" y="4600039"/>
+            <a:ext cx="649537" cy="369332"/>
+          </a:xfrm>
+          <a:prstGeom prst="rect">
+            <a:avLst/>
+          </a:prstGeom>
+          <a:noFill/>
+        </p:spPr>
+        <p:txBody>
+          <a:bodyPr wrap="none" rtlCol="0">
+            <a:spAutoFit/>
+          </a:bodyPr>
+          <a:lstStyle/>
+          <a:p>
+            <a:r>
+              <a:rPr lang="en-GB" dirty="0"/>
+              <a:t>Time</a:t>
+            </a:r>
+          </a:p>
+        </p:txBody>
+      </p:sp>
+    </p:spTree>
+    <p:extLst>
+      <p:ext uri="{BB962C8B-B14F-4D97-AF65-F5344CB8AC3E}">
+        <p14:creationId xmlns:p14="http://schemas.microsoft.com/office/powerpoint/2010/main" val="3606674319"/>
+      </p:ext>
+    </p:extLst>
+  </p:cSld>
+  <p:clrMapOvr>
+    <a:masterClrMapping/>
+  </p:clrMapOvr>
+</p:sld>
+</file>
+
+<file path=ppt/slides/slide3.xml><?xml version="1.0" encoding="utf-8"?>
 <p:sld xmlns:a="http://schemas.openxmlformats.org/drawingml/2006/main" xmlns:r="http://schemas.openxmlformats.org/officeDocument/2006/relationships" xmlns:p="http://schemas.openxmlformats.org/presentationml/2006/main">
   <p:cSld>
     <p:spTree>
@@ -4964,7 +5882,7 @@
 </p:sld>
 </file>
 
-<file path=ppt/slides/slide3.xml><?xml version="1.0" encoding="utf-8"?>
+<file path=ppt/slides/slide4.xml><?xml version="1.0" encoding="utf-8"?>
 <p:sld xmlns:a="http://schemas.openxmlformats.org/drawingml/2006/main" xmlns:r="http://schemas.openxmlformats.org/officeDocument/2006/relationships" xmlns:p="http://schemas.openxmlformats.org/presentationml/2006/main">
   <p:cSld>
     <p:spTree>

</xml_diff>

<commit_message>
Started work on Implementation content
</commit_message>
<xml_diff>
--- a/Figures/Figure-Sources.pptx
+++ b/Figures/Figure-Sources.pptx
@@ -200,7 +200,7 @@
           <a:p>
             <a:fld id="{50E50306-F710-F848-BF66-2AC49711CBBC}" type="datetimeFigureOut">
               <a:rPr lang="en-GB" smtClean="0"/>
-              <a:t>15/07/2018</a:t>
+              <a:t>24/07/2018</a:t>
             </a:fld>
             <a:endParaRPr lang="en-GB"/>
           </a:p>
@@ -599,7 +599,7 @@
           <a:p>
             <a:fld id="{B7B94946-B10A-2B45-BBB3-1C6081FAC149}" type="datetimeFigureOut">
               <a:rPr lang="en-GB" smtClean="0"/>
-              <a:t>15/07/2018</a:t>
+              <a:t>24/07/2018</a:t>
             </a:fld>
             <a:endParaRPr lang="en-GB"/>
           </a:p>
@@ -769,7 +769,7 @@
           <a:p>
             <a:fld id="{B7B94946-B10A-2B45-BBB3-1C6081FAC149}" type="datetimeFigureOut">
               <a:rPr lang="en-GB" smtClean="0"/>
-              <a:t>15/07/2018</a:t>
+              <a:t>24/07/2018</a:t>
             </a:fld>
             <a:endParaRPr lang="en-GB"/>
           </a:p>
@@ -949,7 +949,7 @@
           <a:p>
             <a:fld id="{B7B94946-B10A-2B45-BBB3-1C6081FAC149}" type="datetimeFigureOut">
               <a:rPr lang="en-GB" smtClean="0"/>
-              <a:t>15/07/2018</a:t>
+              <a:t>24/07/2018</a:t>
             </a:fld>
             <a:endParaRPr lang="en-GB"/>
           </a:p>
@@ -1119,7 +1119,7 @@
           <a:p>
             <a:fld id="{B7B94946-B10A-2B45-BBB3-1C6081FAC149}" type="datetimeFigureOut">
               <a:rPr lang="en-GB" smtClean="0"/>
-              <a:t>15/07/2018</a:t>
+              <a:t>24/07/2018</a:t>
             </a:fld>
             <a:endParaRPr lang="en-GB"/>
           </a:p>
@@ -1365,7 +1365,7 @@
           <a:p>
             <a:fld id="{B7B94946-B10A-2B45-BBB3-1C6081FAC149}" type="datetimeFigureOut">
               <a:rPr lang="en-GB" smtClean="0"/>
-              <a:t>15/07/2018</a:t>
+              <a:t>24/07/2018</a:t>
             </a:fld>
             <a:endParaRPr lang="en-GB"/>
           </a:p>
@@ -1597,7 +1597,7 @@
           <a:p>
             <a:fld id="{B7B94946-B10A-2B45-BBB3-1C6081FAC149}" type="datetimeFigureOut">
               <a:rPr lang="en-GB" smtClean="0"/>
-              <a:t>15/07/2018</a:t>
+              <a:t>24/07/2018</a:t>
             </a:fld>
             <a:endParaRPr lang="en-GB"/>
           </a:p>
@@ -1964,7 +1964,7 @@
           <a:p>
             <a:fld id="{B7B94946-B10A-2B45-BBB3-1C6081FAC149}" type="datetimeFigureOut">
               <a:rPr lang="en-GB" smtClean="0"/>
-              <a:t>15/07/2018</a:t>
+              <a:t>24/07/2018</a:t>
             </a:fld>
             <a:endParaRPr lang="en-GB"/>
           </a:p>
@@ -2082,7 +2082,7 @@
           <a:p>
             <a:fld id="{B7B94946-B10A-2B45-BBB3-1C6081FAC149}" type="datetimeFigureOut">
               <a:rPr lang="en-GB" smtClean="0"/>
-              <a:t>15/07/2018</a:t>
+              <a:t>24/07/2018</a:t>
             </a:fld>
             <a:endParaRPr lang="en-GB"/>
           </a:p>
@@ -2177,7 +2177,7 @@
           <a:p>
             <a:fld id="{B7B94946-B10A-2B45-BBB3-1C6081FAC149}" type="datetimeFigureOut">
               <a:rPr lang="en-GB" smtClean="0"/>
-              <a:t>15/07/2018</a:t>
+              <a:t>24/07/2018</a:t>
             </a:fld>
             <a:endParaRPr lang="en-GB"/>
           </a:p>
@@ -2454,7 +2454,7 @@
           <a:p>
             <a:fld id="{B7B94946-B10A-2B45-BBB3-1C6081FAC149}" type="datetimeFigureOut">
               <a:rPr lang="en-GB" smtClean="0"/>
-              <a:t>15/07/2018</a:t>
+              <a:t>24/07/2018</a:t>
             </a:fld>
             <a:endParaRPr lang="en-GB"/>
           </a:p>
@@ -2707,7 +2707,7 @@
           <a:p>
             <a:fld id="{B7B94946-B10A-2B45-BBB3-1C6081FAC149}" type="datetimeFigureOut">
               <a:rPr lang="en-GB" smtClean="0"/>
-              <a:t>15/07/2018</a:t>
+              <a:t>24/07/2018</a:t>
             </a:fld>
             <a:endParaRPr lang="en-GB"/>
           </a:p>
@@ -2920,7 +2920,7 @@
           <a:p>
             <a:fld id="{B7B94946-B10A-2B45-BBB3-1C6081FAC149}" type="datetimeFigureOut">
               <a:rPr lang="en-GB" smtClean="0"/>
-              <a:t>15/07/2018</a:t>
+              <a:t>24/07/2018</a:t>
             </a:fld>
             <a:endParaRPr lang="en-GB"/>
           </a:p>
@@ -5907,8 +5907,8 @@
         </p:nvSpPr>
         <p:spPr>
           <a:xfrm>
-            <a:off x="1185864" y="1927837"/>
-            <a:ext cx="4612418" cy="900000"/>
+            <a:off x="3645558" y="1950541"/>
+            <a:ext cx="1800000" cy="540000"/>
           </a:xfrm>
           <a:prstGeom prst="rect">
             <a:avLst/>
@@ -5949,8 +5949,8 @@
         </p:nvSpPr>
         <p:spPr>
           <a:xfrm>
-            <a:off x="7230481" y="1927837"/>
-            <a:ext cx="1980000" cy="900000"/>
+            <a:off x="7504691" y="1984087"/>
+            <a:ext cx="1430440" cy="900000"/>
           </a:xfrm>
           <a:prstGeom prst="can">
             <a:avLst/>
@@ -6000,8 +6000,8 @@
         </p:nvSpPr>
         <p:spPr>
           <a:xfrm>
-            <a:off x="5998819" y="3184081"/>
-            <a:ext cx="1980000" cy="900000"/>
+            <a:off x="5874142" y="3597842"/>
+            <a:ext cx="1695943" cy="900000"/>
           </a:xfrm>
           <a:prstGeom prst="can">
             <a:avLst/>
@@ -6043,30 +6043,63 @@
           </a:p>
         </p:txBody>
       </p:sp>
-      <p:sp>
-        <p:nvSpPr>
-          <p:cNvPr id="15" name="Snip Single Corner Rectangle 14"/>
+      <p:cxnSp>
+        <p:nvCxnSpPr>
+          <p:cNvPr id="24" name="Straight Arrow Connector 23"/>
+          <p:cNvCxnSpPr>
+            <a:cxnSpLocks/>
+            <a:stCxn id="39" idx="2"/>
+            <a:endCxn id="14" idx="1"/>
+          </p:cNvCxnSpPr>
+          <p:nvPr/>
+        </p:nvCxnSpPr>
+        <p:spPr>
+          <a:xfrm>
+            <a:off x="6722114" y="2944804"/>
+            <a:ext cx="0" cy="653038"/>
+          </a:xfrm>
+          <a:prstGeom prst="straightConnector1">
+            <a:avLst/>
+          </a:prstGeom>
+          <a:ln w="38100">
+            <a:tailEnd type="triangle"/>
+          </a:ln>
+        </p:spPr>
+        <p:style>
+          <a:lnRef idx="1">
+            <a:schemeClr val="accent1"/>
+          </a:lnRef>
+          <a:fillRef idx="0">
+            <a:schemeClr val="accent1"/>
+          </a:fillRef>
+          <a:effectRef idx="0">
+            <a:schemeClr val="accent1"/>
+          </a:effectRef>
+          <a:fontRef idx="minor">
+            <a:schemeClr val="tx1"/>
+          </a:fontRef>
+        </p:style>
+      </p:cxnSp>
+      <p:sp>
+        <p:nvSpPr>
+          <p:cNvPr id="28" name="Rectangle 27"/>
           <p:cNvSpPr/>
           <p:nvPr/>
         </p:nvSpPr>
         <p:spPr>
           <a:xfrm>
-            <a:off x="1560400" y="5450622"/>
-            <a:ext cx="1527858" cy="1143000"/>
-          </a:xfrm>
-          <a:prstGeom prst="snip1Rect">
+            <a:off x="6220173" y="5099912"/>
+            <a:ext cx="2865538" cy="900000"/>
+          </a:xfrm>
+          <a:prstGeom prst="rect">
             <a:avLst/>
           </a:prstGeom>
-          <a:pattFill prst="ltDnDiag">
-            <a:fgClr>
-              <a:schemeClr val="bg1">
-                <a:lumMod val="85000"/>
-              </a:schemeClr>
-            </a:fgClr>
-            <a:bgClr>
-              <a:schemeClr val="bg1"/>
-            </a:bgClr>
-          </a:pattFill>
+          <a:solidFill>
+            <a:schemeClr val="accent5">
+              <a:lumMod val="20000"/>
+              <a:lumOff val="80000"/>
+            </a:schemeClr>
+          </a:solidFill>
         </p:spPr>
         <p:style>
           <a:lnRef idx="1">
@@ -6083,209 +6116,30 @@
           </a:fontRef>
         </p:style>
         <p:txBody>
-          <a:bodyPr rtlCol="0" anchor="ctr"/>
+          <a:bodyPr rtlCol="0" anchor="t"/>
           <a:lstStyle/>
           <a:p>
             <a:pPr algn="ctr"/>
             <a:r>
-              <a:rPr lang="en-GB" dirty="0" err="1"/>
-              <a:t>xADL</a:t>
-            </a:r>
-            <a:r>
               <a:rPr lang="en-GB" dirty="0"/>
-              <a:t> Architectural Description</a:t>
-            </a:r>
-          </a:p>
-        </p:txBody>
-      </p:sp>
-      <p:cxnSp>
-        <p:nvCxnSpPr>
-          <p:cNvPr id="24" name="Straight Arrow Connector 23"/>
-          <p:cNvCxnSpPr>
-            <a:stCxn id="39" idx="3"/>
-            <a:endCxn id="14" idx="2"/>
-          </p:cNvCxnSpPr>
-          <p:nvPr/>
-        </p:nvCxnSpPr>
-        <p:spPr>
-          <a:xfrm>
-            <a:off x="5514570" y="3634081"/>
-            <a:ext cx="484249" cy="0"/>
-          </a:xfrm>
-          <a:prstGeom prst="straightConnector1">
-            <a:avLst/>
-          </a:prstGeom>
-          <a:ln w="38100">
-            <a:tailEnd type="triangle"/>
-          </a:ln>
-        </p:spPr>
-        <p:style>
-          <a:lnRef idx="1">
-            <a:schemeClr val="accent1"/>
-          </a:lnRef>
-          <a:fillRef idx="0">
-            <a:schemeClr val="accent1"/>
-          </a:fillRef>
-          <a:effectRef idx="0">
-            <a:schemeClr val="accent1"/>
-          </a:effectRef>
-          <a:fontRef idx="minor">
-            <a:schemeClr val="tx1"/>
-          </a:fontRef>
-        </p:style>
-      </p:cxnSp>
-      <p:grpSp>
-        <p:nvGrpSpPr>
-          <p:cNvPr id="30" name="Group 29"/>
-          <p:cNvGrpSpPr/>
-          <p:nvPr/>
-        </p:nvGrpSpPr>
-        <p:grpSpPr>
-          <a:xfrm>
-            <a:off x="6787142" y="4701674"/>
-            <a:ext cx="2865538" cy="1598647"/>
-            <a:chOff x="8258458" y="3357564"/>
-            <a:chExt cx="2865538" cy="1598647"/>
-          </a:xfrm>
-          <a:solidFill>
-            <a:schemeClr val="accent5">
-              <a:lumMod val="20000"/>
-              <a:lumOff val="80000"/>
-            </a:schemeClr>
-          </a:solidFill>
-        </p:grpSpPr>
-        <p:sp>
-          <p:nvSpPr>
-            <p:cNvPr id="28" name="Rectangle 27"/>
-            <p:cNvSpPr/>
-            <p:nvPr/>
-          </p:nvSpPr>
-          <p:spPr>
-            <a:xfrm>
-              <a:off x="8258458" y="3357564"/>
-              <a:ext cx="2865538" cy="1598647"/>
-            </a:xfrm>
-            <a:prstGeom prst="rect">
-              <a:avLst/>
-            </a:prstGeom>
-            <a:grpFill/>
-          </p:spPr>
-          <p:style>
-            <a:lnRef idx="1">
-              <a:schemeClr val="accent5"/>
-            </a:lnRef>
-            <a:fillRef idx="2">
-              <a:schemeClr val="accent5"/>
-            </a:fillRef>
-            <a:effectRef idx="1">
-              <a:schemeClr val="accent5"/>
-            </a:effectRef>
-            <a:fontRef idx="minor">
-              <a:schemeClr val="dk1"/>
-            </a:fontRef>
-          </p:style>
-          <p:txBody>
-            <a:bodyPr rtlCol="0" anchor="t"/>
-            <a:lstStyle/>
-            <a:p>
-              <a:pPr algn="ctr"/>
-              <a:r>
-                <a:rPr lang="en-GB" dirty="0"/>
-                <a:t>Apollo Energy Estimator</a:t>
-              </a:r>
-            </a:p>
-          </p:txBody>
-        </p:sp>
-        <p:sp>
-          <p:nvSpPr>
-            <p:cNvPr id="29" name="Rectangle 28"/>
-            <p:cNvSpPr/>
-            <p:nvPr/>
-          </p:nvSpPr>
-          <p:spPr>
-            <a:xfrm>
-              <a:off x="8996852" y="4156887"/>
-              <a:ext cx="1388750" cy="716979"/>
-            </a:xfrm>
-            <a:prstGeom prst="rect">
-              <a:avLst/>
-            </a:prstGeom>
-            <a:grpFill/>
-          </p:spPr>
-          <p:style>
-            <a:lnRef idx="1">
-              <a:schemeClr val="accent5"/>
-            </a:lnRef>
-            <a:fillRef idx="2">
-              <a:schemeClr val="accent5"/>
-            </a:fillRef>
-            <a:effectRef idx="1">
-              <a:schemeClr val="accent5"/>
-            </a:effectRef>
-            <a:fontRef idx="minor">
-              <a:schemeClr val="dk1"/>
-            </a:fontRef>
-          </p:style>
-          <p:txBody>
-            <a:bodyPr rtlCol="0" anchor="ctr"/>
-            <a:lstStyle/>
-            <a:p>
-              <a:pPr algn="ctr"/>
-              <a:r>
-                <a:rPr lang="en-GB" dirty="0"/>
-                <a:t>Energy Model</a:t>
-              </a:r>
-            </a:p>
-          </p:txBody>
-        </p:sp>
-      </p:grpSp>
-      <p:cxnSp>
-        <p:nvCxnSpPr>
-          <p:cNvPr id="31" name="Straight Arrow Connector 30"/>
-          <p:cNvCxnSpPr>
-            <a:stCxn id="15" idx="0"/>
-          </p:cNvCxnSpPr>
-          <p:nvPr/>
-        </p:nvCxnSpPr>
-        <p:spPr>
-          <a:xfrm>
-            <a:off x="3088258" y="6022122"/>
-            <a:ext cx="3698884" cy="0"/>
-          </a:xfrm>
-          <a:prstGeom prst="straightConnector1">
-            <a:avLst/>
-          </a:prstGeom>
-          <a:ln w="38100">
-            <a:tailEnd type="triangle"/>
-          </a:ln>
-        </p:spPr>
-        <p:style>
-          <a:lnRef idx="1">
-            <a:schemeClr val="accent1"/>
-          </a:lnRef>
-          <a:fillRef idx="0">
-            <a:schemeClr val="accent1"/>
-          </a:fillRef>
-          <a:effectRef idx="0">
-            <a:schemeClr val="accent1"/>
-          </a:effectRef>
-          <a:fontRef idx="minor">
-            <a:schemeClr val="tx1"/>
-          </a:fontRef>
-        </p:style>
-      </p:cxnSp>
+              <a:t>Apollo Energy Estimator</a:t>
+            </a:r>
+          </a:p>
+        </p:txBody>
+      </p:sp>
       <p:cxnSp>
         <p:nvCxnSpPr>
           <p:cNvPr id="35" name="Straight Arrow Connector 34"/>
           <p:cNvCxnSpPr>
-            <a:endCxn id="39" idx="0"/>
+            <a:cxnSpLocks/>
+            <a:stCxn id="5" idx="3"/>
           </p:cNvCxnSpPr>
           <p:nvPr/>
         </p:nvCxnSpPr>
         <p:spPr>
           <a:xfrm>
-            <a:off x="4641011" y="2826753"/>
-            <a:ext cx="7760" cy="447328"/>
+            <a:off x="5445558" y="2220541"/>
+            <a:ext cx="605764" cy="0"/>
           </a:xfrm>
           <a:prstGeom prst="straightConnector1">
             <a:avLst/>
@@ -6313,15 +6167,16 @@
         <p:nvCxnSpPr>
           <p:cNvPr id="38" name="Straight Arrow Connector 37"/>
           <p:cNvCxnSpPr>
+            <a:cxnSpLocks/>
             <a:stCxn id="32" idx="2"/>
             <a:endCxn id="12" idx="1"/>
           </p:cNvCxnSpPr>
           <p:nvPr/>
         </p:nvCxnSpPr>
         <p:spPr>
-          <a:xfrm>
-            <a:off x="8219912" y="1526162"/>
-            <a:ext cx="569" cy="401675"/>
+          <a:xfrm flipH="1">
+            <a:off x="8219911" y="1526162"/>
+            <a:ext cx="1" cy="457925"/>
           </a:xfrm>
           <a:prstGeom prst="straightConnector1">
             <a:avLst/>
@@ -6345,113 +6200,6 @@
           </a:fontRef>
         </p:style>
       </p:cxnSp>
-      <p:grpSp>
-        <p:nvGrpSpPr>
-          <p:cNvPr id="13" name="Group 12"/>
-          <p:cNvGrpSpPr/>
-          <p:nvPr/>
-        </p:nvGrpSpPr>
-        <p:grpSpPr>
-          <a:xfrm>
-            <a:off x="1560399" y="197407"/>
-            <a:ext cx="1800000" cy="1648645"/>
-            <a:chOff x="1560399" y="197407"/>
-            <a:chExt cx="1800000" cy="1648645"/>
-          </a:xfrm>
-        </p:grpSpPr>
-        <p:sp>
-          <p:nvSpPr>
-            <p:cNvPr id="6" name="Rectangle 5"/>
-            <p:cNvSpPr/>
-            <p:nvPr/>
-          </p:nvSpPr>
-          <p:spPr>
-            <a:xfrm>
-              <a:off x="1707016" y="315693"/>
-              <a:ext cx="1512000" cy="1152000"/>
-            </a:xfrm>
-            <a:prstGeom prst="rect">
-              <a:avLst/>
-            </a:prstGeom>
-            <a:pattFill prst="pct5">
-              <a:fgClr>
-                <a:schemeClr val="accent1"/>
-              </a:fgClr>
-              <a:bgClr>
-                <a:schemeClr val="bg1"/>
-              </a:bgClr>
-            </a:pattFill>
-          </p:spPr>
-          <p:style>
-            <a:lnRef idx="1">
-              <a:schemeClr val="accent5"/>
-            </a:lnRef>
-            <a:fillRef idx="2">
-              <a:schemeClr val="accent5"/>
-            </a:fillRef>
-            <a:effectRef idx="1">
-              <a:schemeClr val="accent5"/>
-            </a:effectRef>
-            <a:fontRef idx="minor">
-              <a:schemeClr val="dk1"/>
-            </a:fontRef>
-          </p:style>
-          <p:txBody>
-            <a:bodyPr rtlCol="0" anchor="ctr"/>
-            <a:lstStyle/>
-            <a:p>
-              <a:pPr algn="ctr"/>
-              <a:r>
-                <a:rPr lang="en-GB" dirty="0"/>
-                <a:t>Other Service</a:t>
-              </a:r>
-            </a:p>
-          </p:txBody>
-        </p:sp>
-        <p:sp>
-          <p:nvSpPr>
-            <p:cNvPr id="22" name="Rectangle 21"/>
-            <p:cNvSpPr/>
-            <p:nvPr/>
-          </p:nvSpPr>
-          <p:spPr>
-            <a:xfrm>
-              <a:off x="1560399" y="197407"/>
-              <a:ext cx="1800000" cy="1648645"/>
-            </a:xfrm>
-            <a:prstGeom prst="rect">
-              <a:avLst/>
-            </a:prstGeom>
-            <a:noFill/>
-          </p:spPr>
-          <p:style>
-            <a:lnRef idx="1">
-              <a:schemeClr val="accent5"/>
-            </a:lnRef>
-            <a:fillRef idx="2">
-              <a:schemeClr val="accent5"/>
-            </a:fillRef>
-            <a:effectRef idx="1">
-              <a:schemeClr val="accent5"/>
-            </a:effectRef>
-            <a:fontRef idx="minor">
-              <a:schemeClr val="dk1"/>
-            </a:fontRef>
-          </p:style>
-          <p:txBody>
-            <a:bodyPr rtlCol="0" anchor="b"/>
-            <a:lstStyle/>
-            <a:p>
-              <a:pPr algn="ctr"/>
-              <a:r>
-                <a:rPr lang="en-GB"/>
-                <a:t>Docker Container</a:t>
-              </a:r>
-              <a:endParaRPr lang="en-GB" dirty="0"/>
-            </a:p>
-          </p:txBody>
-        </p:sp>
-      </p:grpSp>
       <p:grpSp>
         <p:nvGrpSpPr>
           <p:cNvPr id="11" name="Group 10"/>
@@ -6675,8 +6423,8 @@
         </p:nvSpPr>
         <p:spPr>
           <a:xfrm>
-            <a:off x="3782971" y="3274081"/>
-            <a:ext cx="1731599" cy="720000"/>
+            <a:off x="6051322" y="2089143"/>
+            <a:ext cx="1341584" cy="855661"/>
           </a:xfrm>
           <a:prstGeom prst="rect">
             <a:avLst/>
@@ -6721,8 +6469,8 @@
         </p:nvSpPr>
         <p:spPr>
           <a:xfrm>
-            <a:off x="1322016" y="4047842"/>
-            <a:ext cx="1300413" cy="1143000"/>
+            <a:off x="3645557" y="5129615"/>
+            <a:ext cx="1300413" cy="870297"/>
           </a:xfrm>
           <a:prstGeom prst="snip1Rect">
             <a:avLst/>
@@ -6767,49 +6515,18 @@
       </p:sp>
       <p:cxnSp>
         <p:nvCxnSpPr>
-          <p:cNvPr id="53" name="Straight Arrow Connector 52"/>
+          <p:cNvPr id="60" name="Straight Arrow Connector 59"/>
           <p:cNvCxnSpPr>
-            <a:endCxn id="52" idx="3"/>
+            <a:cxnSpLocks/>
+            <a:stCxn id="52" idx="0"/>
+            <a:endCxn id="28" idx="1"/>
           </p:cNvCxnSpPr>
           <p:nvPr/>
         </p:nvCxnSpPr>
         <p:spPr>
-          <a:xfrm>
-            <a:off x="1952624" y="2826753"/>
-            <a:ext cx="0" cy="1221089"/>
-          </a:xfrm>
-          <a:prstGeom prst="straightConnector1">
-            <a:avLst/>
-          </a:prstGeom>
-          <a:ln w="38100">
-            <a:tailEnd type="triangle"/>
-          </a:ln>
-        </p:spPr>
-        <p:style>
-          <a:lnRef idx="1">
-            <a:schemeClr val="accent1"/>
-          </a:lnRef>
-          <a:fillRef idx="0">
-            <a:schemeClr val="accent1"/>
-          </a:fillRef>
-          <a:effectRef idx="0">
-            <a:schemeClr val="accent1"/>
-          </a:effectRef>
-          <a:fontRef idx="minor">
-            <a:schemeClr val="tx1"/>
-          </a:fontRef>
-        </p:style>
-      </p:cxnSp>
-      <p:cxnSp>
-        <p:nvCxnSpPr>
-          <p:cNvPr id="60" name="Straight Arrow Connector 59"/>
-          <p:cNvCxnSpPr/>
-          <p:nvPr/>
-        </p:nvCxnSpPr>
-        <p:spPr>
-          <a:xfrm>
-            <a:off x="2622429" y="4932319"/>
-            <a:ext cx="4164713" cy="0"/>
+          <a:xfrm flipV="1">
+            <a:off x="4945970" y="5549912"/>
+            <a:ext cx="1274203" cy="14852"/>
           </a:xfrm>
           <a:prstGeom prst="straightConnector1">
             <a:avLst/>
@@ -6837,15 +6554,15 @@
         <p:nvCxnSpPr>
           <p:cNvPr id="62" name="Straight Arrow Connector 61"/>
           <p:cNvCxnSpPr>
+            <a:cxnSpLocks/>
             <a:stCxn id="12" idx="3"/>
-            <a:endCxn id="28" idx="0"/>
           </p:cNvCxnSpPr>
           <p:nvPr/>
         </p:nvCxnSpPr>
         <p:spPr>
-          <a:xfrm flipH="1">
-            <a:off x="8219911" y="2827837"/>
-            <a:ext cx="570" cy="1873837"/>
+          <a:xfrm>
+            <a:off x="8219911" y="2884087"/>
+            <a:ext cx="0" cy="2215825"/>
           </a:xfrm>
           <a:prstGeom prst="straightConnector1">
             <a:avLst/>
@@ -6873,13 +6590,14 @@
         <p:nvCxnSpPr>
           <p:cNvPr id="65" name="Straight Arrow Connector 64"/>
           <p:cNvCxnSpPr>
+            <a:cxnSpLocks/>
             <a:stCxn id="14" idx="3"/>
           </p:cNvCxnSpPr>
           <p:nvPr/>
         </p:nvCxnSpPr>
         <p:spPr>
           <a:xfrm>
-            <a:off x="6988819" y="4084081"/>
+            <a:off x="6722114" y="4497842"/>
             <a:ext cx="0" cy="617593"/>
           </a:xfrm>
           <a:prstGeom prst="straightConnector1">
@@ -6920,6 +6638,141 @@
           </a:xfrm>
           <a:prstGeom prst="straightConnector1">
             <a:avLst/>
+          </a:prstGeom>
+          <a:ln w="38100">
+            <a:tailEnd type="triangle"/>
+          </a:ln>
+        </p:spPr>
+        <p:style>
+          <a:lnRef idx="1">
+            <a:schemeClr val="accent1"/>
+          </a:lnRef>
+          <a:fillRef idx="0">
+            <a:schemeClr val="accent1"/>
+          </a:fillRef>
+          <a:effectRef idx="0">
+            <a:schemeClr val="accent1"/>
+          </a:effectRef>
+          <a:fontRef idx="minor">
+            <a:schemeClr val="tx1"/>
+          </a:fontRef>
+        </p:style>
+      </p:cxnSp>
+      <p:sp>
+        <p:nvSpPr>
+          <p:cNvPr id="33" name="Rectangle 32">
+            <a:extLst>
+              <a:ext uri="{FF2B5EF4-FFF2-40B4-BE49-F238E27FC236}">
+                <a16:creationId xmlns:a16="http://schemas.microsoft.com/office/drawing/2014/main" id="{FAE7E08E-EB19-AF44-B744-7C781D9A6323}"/>
+              </a:ext>
+            </a:extLst>
+          </p:cNvPr>
+          <p:cNvSpPr/>
+          <p:nvPr/>
+        </p:nvSpPr>
+        <p:spPr>
+          <a:xfrm>
+            <a:off x="3645557" y="2544279"/>
+            <a:ext cx="1800001" cy="540000"/>
+          </a:xfrm>
+          <a:prstGeom prst="rect">
+            <a:avLst/>
+          </a:prstGeom>
+          <a:noFill/>
+        </p:spPr>
+        <p:style>
+          <a:lnRef idx="1">
+            <a:schemeClr val="accent5"/>
+          </a:lnRef>
+          <a:fillRef idx="2">
+            <a:schemeClr val="accent5"/>
+          </a:fillRef>
+          <a:effectRef idx="1">
+            <a:schemeClr val="accent5"/>
+          </a:effectRef>
+          <a:fontRef idx="minor">
+            <a:schemeClr val="dk1"/>
+          </a:fontRef>
+        </p:style>
+        <p:txBody>
+          <a:bodyPr rtlCol="0" anchor="ctr"/>
+          <a:lstStyle/>
+          <a:p>
+            <a:pPr algn="ctr"/>
+            <a:r>
+              <a:rPr lang="en-GB" dirty="0"/>
+              <a:t>Host Runtime</a:t>
+            </a:r>
+          </a:p>
+        </p:txBody>
+      </p:sp>
+      <p:cxnSp>
+        <p:nvCxnSpPr>
+          <p:cNvPr id="51" name="Straight Arrow Connector 50">
+            <a:extLst>
+              <a:ext uri="{FF2B5EF4-FFF2-40B4-BE49-F238E27FC236}">
+                <a16:creationId xmlns:a16="http://schemas.microsoft.com/office/drawing/2014/main" id="{E1FC0897-D58A-DA4E-A20B-0B06103467E9}"/>
+              </a:ext>
+            </a:extLst>
+          </p:cNvPr>
+          <p:cNvCxnSpPr>
+            <a:cxnSpLocks/>
+            <a:stCxn id="33" idx="3"/>
+          </p:cNvCxnSpPr>
+          <p:nvPr/>
+        </p:nvCxnSpPr>
+        <p:spPr>
+          <a:xfrm>
+            <a:off x="5445558" y="2814279"/>
+            <a:ext cx="605764" cy="0"/>
+          </a:xfrm>
+          <a:prstGeom prst="straightConnector1">
+            <a:avLst/>
+          </a:prstGeom>
+          <a:ln w="38100">
+            <a:tailEnd type="triangle"/>
+          </a:ln>
+        </p:spPr>
+        <p:style>
+          <a:lnRef idx="1">
+            <a:schemeClr val="accent1"/>
+          </a:lnRef>
+          <a:fillRef idx="0">
+            <a:schemeClr val="accent1"/>
+          </a:fillRef>
+          <a:effectRef idx="0">
+            <a:schemeClr val="accent1"/>
+          </a:effectRef>
+          <a:fontRef idx="minor">
+            <a:schemeClr val="tx1"/>
+          </a:fontRef>
+        </p:style>
+      </p:cxnSp>
+      <p:cxnSp>
+        <p:nvCxnSpPr>
+          <p:cNvPr id="67" name="Elbow Connector 66">
+            <a:extLst>
+              <a:ext uri="{FF2B5EF4-FFF2-40B4-BE49-F238E27FC236}">
+                <a16:creationId xmlns:a16="http://schemas.microsoft.com/office/drawing/2014/main" id="{166B432F-5FB3-D840-BDAC-252EC41EDA2D}"/>
+              </a:ext>
+            </a:extLst>
+          </p:cNvPr>
+          <p:cNvCxnSpPr>
+            <a:cxnSpLocks/>
+            <a:stCxn id="5" idx="1"/>
+            <a:endCxn id="52" idx="2"/>
+          </p:cNvCxnSpPr>
+          <p:nvPr/>
+        </p:nvCxnSpPr>
+        <p:spPr>
+          <a:xfrm rot="10800000" flipV="1">
+            <a:off x="3645558" y="2220540"/>
+            <a:ext cx="1" cy="3344223"/>
+          </a:xfrm>
+          <a:prstGeom prst="bentConnector3">
+            <a:avLst>
+              <a:gd name="adj1" fmla="val 22860100000"/>
+            </a:avLst>
           </a:prstGeom>
           <a:ln w="38100">
             <a:tailEnd type="triangle"/>

</xml_diff>

<commit_message>
Work on Design Principles chapter
</commit_message>
<xml_diff>
--- a/Figures/Figure-Sources.pptx
+++ b/Figures/Figure-Sources.pptx
@@ -5,13 +5,14 @@
     <p:sldMasterId id="2147483648" r:id="rId1"/>
   </p:sldMasterIdLst>
   <p:notesMasterIdLst>
-    <p:notesMasterId r:id="rId6"/>
+    <p:notesMasterId r:id="rId7"/>
   </p:notesMasterIdLst>
   <p:sldIdLst>
-    <p:sldId id="256" r:id="rId2"/>
-    <p:sldId id="259" r:id="rId3"/>
-    <p:sldId id="257" r:id="rId4"/>
-    <p:sldId id="258" r:id="rId5"/>
+    <p:sldId id="260" r:id="rId2"/>
+    <p:sldId id="256" r:id="rId3"/>
+    <p:sldId id="259" r:id="rId4"/>
+    <p:sldId id="257" r:id="rId5"/>
+    <p:sldId id="258" r:id="rId6"/>
   </p:sldIdLst>
   <p:sldSz cx="12192000" cy="6858000"/>
   <p:notesSz cx="6858000" cy="9144000"/>
@@ -200,7 +201,7 @@
           <a:p>
             <a:fld id="{50E50306-F710-F848-BF66-2AC49711CBBC}" type="datetimeFigureOut">
               <a:rPr lang="en-GB" smtClean="0"/>
-              <a:t>24/07/2018</a:t>
+              <a:t>21/08/2018</a:t>
             </a:fld>
             <a:endParaRPr lang="en-GB"/>
           </a:p>
@@ -468,6 +469,90 @@
 </p:notesMaster>
 </file>
 
+<file path=ppt/notesSlides/notesSlide1.xml><?xml version="1.0" encoding="utf-8"?>
+<p:notes xmlns:a="http://schemas.openxmlformats.org/drawingml/2006/main" xmlns:r="http://schemas.openxmlformats.org/officeDocument/2006/relationships" xmlns:p="http://schemas.openxmlformats.org/presentationml/2006/main">
+  <p:cSld>
+    <p:spTree>
+      <p:nvGrpSpPr>
+        <p:cNvPr id="1" name=""/>
+        <p:cNvGrpSpPr/>
+        <p:nvPr/>
+      </p:nvGrpSpPr>
+      <p:grpSpPr>
+        <a:xfrm>
+          <a:off x="0" y="0"/>
+          <a:ext cx="0" cy="0"/>
+          <a:chOff x="0" y="0"/>
+          <a:chExt cx="0" cy="0"/>
+        </a:xfrm>
+      </p:grpSpPr>
+      <p:sp>
+        <p:nvSpPr>
+          <p:cNvPr id="2" name="Slide Image Placeholder 1"/>
+          <p:cNvSpPr>
+            <a:spLocks noGrp="1" noRot="1" noChangeAspect="1"/>
+          </p:cNvSpPr>
+          <p:nvPr>
+            <p:ph type="sldImg"/>
+          </p:nvPr>
+        </p:nvSpPr>
+        <p:spPr/>
+      </p:sp>
+      <p:sp>
+        <p:nvSpPr>
+          <p:cNvPr id="3" name="Notes Placeholder 2"/>
+          <p:cNvSpPr>
+            <a:spLocks noGrp="1"/>
+          </p:cNvSpPr>
+          <p:nvPr>
+            <p:ph type="body" idx="1"/>
+          </p:nvPr>
+        </p:nvSpPr>
+        <p:spPr/>
+        <p:txBody>
+          <a:bodyPr/>
+          <a:lstStyle/>
+          <a:p>
+            <a:endParaRPr lang="en-GB" dirty="0"/>
+          </a:p>
+        </p:txBody>
+      </p:sp>
+      <p:sp>
+        <p:nvSpPr>
+          <p:cNvPr id="4" name="Slide Number Placeholder 3"/>
+          <p:cNvSpPr>
+            <a:spLocks noGrp="1"/>
+          </p:cNvSpPr>
+          <p:nvPr>
+            <p:ph type="sldNum" sz="quarter" idx="10"/>
+          </p:nvPr>
+        </p:nvSpPr>
+        <p:spPr/>
+        <p:txBody>
+          <a:bodyPr/>
+          <a:lstStyle/>
+          <a:p>
+            <a:fld id="{EED8BDB8-82B8-384D-A9E0-069D1F86B9F0}" type="slidenum">
+              <a:rPr lang="en-GB" smtClean="0"/>
+              <a:t>1</a:t>
+            </a:fld>
+            <a:endParaRPr lang="en-GB"/>
+          </a:p>
+        </p:txBody>
+      </p:sp>
+    </p:spTree>
+    <p:extLst>
+      <p:ext uri="{BB962C8B-B14F-4D97-AF65-F5344CB8AC3E}">
+        <p14:creationId xmlns:p14="http://schemas.microsoft.com/office/powerpoint/2010/main" val="349140056"/>
+      </p:ext>
+    </p:extLst>
+  </p:cSld>
+  <p:clrMapOvr>
+    <a:masterClrMapping/>
+  </p:clrMapOvr>
+</p:notes>
+</file>
+
 <file path=ppt/slideLayouts/slideLayout1.xml><?xml version="1.0" encoding="utf-8"?>
 <p:sldLayout xmlns:a="http://schemas.openxmlformats.org/drawingml/2006/main" xmlns:r="http://schemas.openxmlformats.org/officeDocument/2006/relationships" xmlns:p="http://schemas.openxmlformats.org/presentationml/2006/main" type="title" preserve="1">
   <p:cSld name="Title Slide">
@@ -599,7 +684,7 @@
           <a:p>
             <a:fld id="{B7B94946-B10A-2B45-BBB3-1C6081FAC149}" type="datetimeFigureOut">
               <a:rPr lang="en-GB" smtClean="0"/>
-              <a:t>24/07/2018</a:t>
+              <a:t>21/08/2018</a:t>
             </a:fld>
             <a:endParaRPr lang="en-GB"/>
           </a:p>
@@ -769,7 +854,7 @@
           <a:p>
             <a:fld id="{B7B94946-B10A-2B45-BBB3-1C6081FAC149}" type="datetimeFigureOut">
               <a:rPr lang="en-GB" smtClean="0"/>
-              <a:t>24/07/2018</a:t>
+              <a:t>21/08/2018</a:t>
             </a:fld>
             <a:endParaRPr lang="en-GB"/>
           </a:p>
@@ -949,7 +1034,7 @@
           <a:p>
             <a:fld id="{B7B94946-B10A-2B45-BBB3-1C6081FAC149}" type="datetimeFigureOut">
               <a:rPr lang="en-GB" smtClean="0"/>
-              <a:t>24/07/2018</a:t>
+              <a:t>21/08/2018</a:t>
             </a:fld>
             <a:endParaRPr lang="en-GB"/>
           </a:p>
@@ -1119,7 +1204,7 @@
           <a:p>
             <a:fld id="{B7B94946-B10A-2B45-BBB3-1C6081FAC149}" type="datetimeFigureOut">
               <a:rPr lang="en-GB" smtClean="0"/>
-              <a:t>24/07/2018</a:t>
+              <a:t>21/08/2018</a:t>
             </a:fld>
             <a:endParaRPr lang="en-GB"/>
           </a:p>
@@ -1365,7 +1450,7 @@
           <a:p>
             <a:fld id="{B7B94946-B10A-2B45-BBB3-1C6081FAC149}" type="datetimeFigureOut">
               <a:rPr lang="en-GB" smtClean="0"/>
-              <a:t>24/07/2018</a:t>
+              <a:t>21/08/2018</a:t>
             </a:fld>
             <a:endParaRPr lang="en-GB"/>
           </a:p>
@@ -1597,7 +1682,7 @@
           <a:p>
             <a:fld id="{B7B94946-B10A-2B45-BBB3-1C6081FAC149}" type="datetimeFigureOut">
               <a:rPr lang="en-GB" smtClean="0"/>
-              <a:t>24/07/2018</a:t>
+              <a:t>21/08/2018</a:t>
             </a:fld>
             <a:endParaRPr lang="en-GB"/>
           </a:p>
@@ -1964,7 +2049,7 @@
           <a:p>
             <a:fld id="{B7B94946-B10A-2B45-BBB3-1C6081FAC149}" type="datetimeFigureOut">
               <a:rPr lang="en-GB" smtClean="0"/>
-              <a:t>24/07/2018</a:t>
+              <a:t>21/08/2018</a:t>
             </a:fld>
             <a:endParaRPr lang="en-GB"/>
           </a:p>
@@ -2082,7 +2167,7 @@
           <a:p>
             <a:fld id="{B7B94946-B10A-2B45-BBB3-1C6081FAC149}" type="datetimeFigureOut">
               <a:rPr lang="en-GB" smtClean="0"/>
-              <a:t>24/07/2018</a:t>
+              <a:t>21/08/2018</a:t>
             </a:fld>
             <a:endParaRPr lang="en-GB"/>
           </a:p>
@@ -2177,7 +2262,7 @@
           <a:p>
             <a:fld id="{B7B94946-B10A-2B45-BBB3-1C6081FAC149}" type="datetimeFigureOut">
               <a:rPr lang="en-GB" smtClean="0"/>
-              <a:t>24/07/2018</a:t>
+              <a:t>21/08/2018</a:t>
             </a:fld>
             <a:endParaRPr lang="en-GB"/>
           </a:p>
@@ -2454,7 +2539,7 @@
           <a:p>
             <a:fld id="{B7B94946-B10A-2B45-BBB3-1C6081FAC149}" type="datetimeFigureOut">
               <a:rPr lang="en-GB" smtClean="0"/>
-              <a:t>24/07/2018</a:t>
+              <a:t>21/08/2018</a:t>
             </a:fld>
             <a:endParaRPr lang="en-GB"/>
           </a:p>
@@ -2707,7 +2792,7 @@
           <a:p>
             <a:fld id="{B7B94946-B10A-2B45-BBB3-1C6081FAC149}" type="datetimeFigureOut">
               <a:rPr lang="en-GB" smtClean="0"/>
-              <a:t>24/07/2018</a:t>
+              <a:t>21/08/2018</a:t>
             </a:fld>
             <a:endParaRPr lang="en-GB"/>
           </a:p>
@@ -2920,7 +3005,7 @@
           <a:p>
             <a:fld id="{B7B94946-B10A-2B45-BBB3-1C6081FAC149}" type="datetimeFigureOut">
               <a:rPr lang="en-GB" smtClean="0"/>
-              <a:t>24/07/2018</a:t>
+              <a:t>21/08/2018</a:t>
             </a:fld>
             <a:endParaRPr lang="en-GB"/>
           </a:p>
@@ -3327,6 +3412,1657 @@
       </p:grpSpPr>
       <p:sp>
         <p:nvSpPr>
+          <p:cNvPr id="2" name="Rectangle 1"/>
+          <p:cNvSpPr/>
+          <p:nvPr/>
+        </p:nvSpPr>
+        <p:spPr>
+          <a:xfrm>
+            <a:off x="535577" y="718460"/>
+            <a:ext cx="5238206" cy="2377440"/>
+          </a:xfrm>
+          <a:prstGeom prst="rect">
+            <a:avLst/>
+          </a:prstGeom>
+          <a:solidFill>
+            <a:schemeClr val="accent1">
+              <a:lumMod val="20000"/>
+              <a:lumOff val="80000"/>
+            </a:schemeClr>
+          </a:solidFill>
+        </p:spPr>
+        <p:style>
+          <a:lnRef idx="2">
+            <a:schemeClr val="accent1">
+              <a:shade val="50000"/>
+            </a:schemeClr>
+          </a:lnRef>
+          <a:fillRef idx="1">
+            <a:schemeClr val="accent1"/>
+          </a:fillRef>
+          <a:effectRef idx="0">
+            <a:schemeClr val="accent1"/>
+          </a:effectRef>
+          <a:fontRef idx="minor">
+            <a:schemeClr val="lt1"/>
+          </a:fontRef>
+        </p:style>
+        <p:txBody>
+          <a:bodyPr rtlCol="0" anchor="t"/>
+          <a:lstStyle/>
+          <a:p>
+            <a:r>
+              <a:rPr lang="en-GB" dirty="0" smtClean="0">
+                <a:solidFill>
+                  <a:schemeClr val="tx1"/>
+                </a:solidFill>
+              </a:rPr>
+              <a:t>Data </a:t>
+            </a:r>
+            <a:r>
+              <a:rPr lang="en-GB" dirty="0" smtClean="0">
+                <a:solidFill>
+                  <a:schemeClr val="tx1"/>
+                </a:solidFill>
+              </a:rPr>
+              <a:t>Centre</a:t>
+            </a:r>
+            <a:endParaRPr lang="en-GB" dirty="0">
+              <a:solidFill>
+                <a:schemeClr val="tx1"/>
+              </a:solidFill>
+            </a:endParaRPr>
+          </a:p>
+        </p:txBody>
+      </p:sp>
+      <p:cxnSp>
+        <p:nvCxnSpPr>
+          <p:cNvPr id="4" name="Straight Connector 3"/>
+          <p:cNvCxnSpPr/>
+          <p:nvPr/>
+        </p:nvCxnSpPr>
+        <p:spPr>
+          <a:xfrm>
+            <a:off x="365760" y="3409407"/>
+            <a:ext cx="10541726" cy="0"/>
+          </a:xfrm>
+          <a:prstGeom prst="line">
+            <a:avLst/>
+          </a:prstGeom>
+          <a:ln w="28575">
+            <a:solidFill>
+              <a:schemeClr val="tx1"/>
+            </a:solidFill>
+            <a:prstDash val="dash"/>
+          </a:ln>
+        </p:spPr>
+        <p:style>
+          <a:lnRef idx="1">
+            <a:schemeClr val="accent1"/>
+          </a:lnRef>
+          <a:fillRef idx="0">
+            <a:schemeClr val="accent1"/>
+          </a:fillRef>
+          <a:effectRef idx="0">
+            <a:schemeClr val="accent1"/>
+          </a:effectRef>
+          <a:fontRef idx="minor">
+            <a:schemeClr val="tx1"/>
+          </a:fontRef>
+        </p:style>
+      </p:cxnSp>
+      <p:sp>
+        <p:nvSpPr>
+          <p:cNvPr id="5" name="Rectangle 4"/>
+          <p:cNvSpPr/>
+          <p:nvPr/>
+        </p:nvSpPr>
+        <p:spPr>
+          <a:xfrm>
+            <a:off x="2378758" y="966380"/>
+            <a:ext cx="1632858" cy="613955"/>
+          </a:xfrm>
+          <a:prstGeom prst="rect">
+            <a:avLst/>
+          </a:prstGeom>
+        </p:spPr>
+        <p:style>
+          <a:lnRef idx="2">
+            <a:schemeClr val="accent1">
+              <a:shade val="50000"/>
+            </a:schemeClr>
+          </a:lnRef>
+          <a:fillRef idx="1">
+            <a:schemeClr val="accent1"/>
+          </a:fillRef>
+          <a:effectRef idx="0">
+            <a:schemeClr val="accent1"/>
+          </a:effectRef>
+          <a:fontRef idx="minor">
+            <a:schemeClr val="lt1"/>
+          </a:fontRef>
+        </p:style>
+        <p:txBody>
+          <a:bodyPr rtlCol="0" anchor="ctr"/>
+          <a:lstStyle/>
+          <a:p>
+            <a:pPr algn="ctr"/>
+            <a:r>
+              <a:rPr lang="en-GB" dirty="0" smtClean="0"/>
+              <a:t>Request Handler</a:t>
+            </a:r>
+            <a:endParaRPr lang="en-GB" dirty="0"/>
+          </a:p>
+        </p:txBody>
+      </p:sp>
+      <p:grpSp>
+        <p:nvGrpSpPr>
+          <p:cNvPr id="9" name="Group 8"/>
+          <p:cNvGrpSpPr/>
+          <p:nvPr/>
+        </p:nvGrpSpPr>
+        <p:grpSpPr>
+          <a:xfrm>
+            <a:off x="856706" y="2023111"/>
+            <a:ext cx="1356359" cy="785950"/>
+            <a:chOff x="5488578" y="1417320"/>
+            <a:chExt cx="1746066" cy="785950"/>
+          </a:xfrm>
+        </p:grpSpPr>
+        <p:sp>
+          <p:nvSpPr>
+            <p:cNvPr id="7" name="Rectangle 6"/>
+            <p:cNvSpPr/>
+            <p:nvPr/>
+          </p:nvSpPr>
+          <p:spPr>
+            <a:xfrm>
+              <a:off x="5601786" y="1417320"/>
+              <a:ext cx="1632858" cy="613955"/>
+            </a:xfrm>
+            <a:prstGeom prst="rect">
+              <a:avLst/>
+            </a:prstGeom>
+          </p:spPr>
+          <p:style>
+            <a:lnRef idx="2">
+              <a:schemeClr val="accent1">
+                <a:shade val="50000"/>
+              </a:schemeClr>
+            </a:lnRef>
+            <a:fillRef idx="1">
+              <a:schemeClr val="accent1"/>
+            </a:fillRef>
+            <a:effectRef idx="0">
+              <a:schemeClr val="accent1"/>
+            </a:effectRef>
+            <a:fontRef idx="minor">
+              <a:schemeClr val="lt1"/>
+            </a:fontRef>
+          </p:style>
+          <p:txBody>
+            <a:bodyPr rtlCol="0" anchor="ctr"/>
+            <a:lstStyle/>
+            <a:p>
+              <a:pPr algn="ctr"/>
+              <a:endParaRPr lang="en-GB" dirty="0"/>
+            </a:p>
+          </p:txBody>
+        </p:sp>
+        <p:sp>
+          <p:nvSpPr>
+            <p:cNvPr id="8" name="Rectangle 7"/>
+            <p:cNvSpPr/>
+            <p:nvPr/>
+          </p:nvSpPr>
+          <p:spPr>
+            <a:xfrm>
+              <a:off x="5545182" y="1496786"/>
+              <a:ext cx="1632858" cy="613955"/>
+            </a:xfrm>
+            <a:prstGeom prst="rect">
+              <a:avLst/>
+            </a:prstGeom>
+          </p:spPr>
+          <p:style>
+            <a:lnRef idx="2">
+              <a:schemeClr val="accent1">
+                <a:shade val="50000"/>
+              </a:schemeClr>
+            </a:lnRef>
+            <a:fillRef idx="1">
+              <a:schemeClr val="accent1"/>
+            </a:fillRef>
+            <a:effectRef idx="0">
+              <a:schemeClr val="accent1"/>
+            </a:effectRef>
+            <a:fontRef idx="minor">
+              <a:schemeClr val="lt1"/>
+            </a:fontRef>
+          </p:style>
+          <p:txBody>
+            <a:bodyPr rtlCol="0" anchor="ctr"/>
+            <a:lstStyle/>
+            <a:p>
+              <a:pPr algn="ctr"/>
+              <a:endParaRPr lang="en-GB" dirty="0"/>
+            </a:p>
+          </p:txBody>
+        </p:sp>
+        <p:sp>
+          <p:nvSpPr>
+            <p:cNvPr id="6" name="Rectangle 5"/>
+            <p:cNvSpPr/>
+            <p:nvPr/>
+          </p:nvSpPr>
+          <p:spPr>
+            <a:xfrm>
+              <a:off x="5488578" y="1589315"/>
+              <a:ext cx="1632858" cy="613955"/>
+            </a:xfrm>
+            <a:prstGeom prst="rect">
+              <a:avLst/>
+            </a:prstGeom>
+          </p:spPr>
+          <p:style>
+            <a:lnRef idx="2">
+              <a:schemeClr val="accent1">
+                <a:shade val="50000"/>
+              </a:schemeClr>
+            </a:lnRef>
+            <a:fillRef idx="1">
+              <a:schemeClr val="accent1"/>
+            </a:fillRef>
+            <a:effectRef idx="0">
+              <a:schemeClr val="accent1"/>
+            </a:effectRef>
+            <a:fontRef idx="minor">
+              <a:schemeClr val="lt1"/>
+            </a:fontRef>
+          </p:style>
+          <p:txBody>
+            <a:bodyPr rtlCol="0" anchor="ctr"/>
+            <a:lstStyle/>
+            <a:p>
+              <a:pPr algn="ctr"/>
+              <a:r>
+                <a:rPr lang="en-GB" dirty="0" smtClean="0"/>
+                <a:t>Business Service</a:t>
+              </a:r>
+              <a:endParaRPr lang="en-GB" dirty="0"/>
+            </a:p>
+          </p:txBody>
+        </p:sp>
+      </p:grpSp>
+      <p:grpSp>
+        <p:nvGrpSpPr>
+          <p:cNvPr id="10" name="Group 9"/>
+          <p:cNvGrpSpPr/>
+          <p:nvPr/>
+        </p:nvGrpSpPr>
+        <p:grpSpPr>
+          <a:xfrm>
+            <a:off x="2512226" y="2023111"/>
+            <a:ext cx="1356359" cy="785950"/>
+            <a:chOff x="5488578" y="1417320"/>
+            <a:chExt cx="1746066" cy="785950"/>
+          </a:xfrm>
+        </p:grpSpPr>
+        <p:sp>
+          <p:nvSpPr>
+            <p:cNvPr id="11" name="Rectangle 10"/>
+            <p:cNvSpPr/>
+            <p:nvPr/>
+          </p:nvSpPr>
+          <p:spPr>
+            <a:xfrm>
+              <a:off x="5601786" y="1417320"/>
+              <a:ext cx="1632858" cy="613955"/>
+            </a:xfrm>
+            <a:prstGeom prst="rect">
+              <a:avLst/>
+            </a:prstGeom>
+          </p:spPr>
+          <p:style>
+            <a:lnRef idx="2">
+              <a:schemeClr val="accent1">
+                <a:shade val="50000"/>
+              </a:schemeClr>
+            </a:lnRef>
+            <a:fillRef idx="1">
+              <a:schemeClr val="accent1"/>
+            </a:fillRef>
+            <a:effectRef idx="0">
+              <a:schemeClr val="accent1"/>
+            </a:effectRef>
+            <a:fontRef idx="minor">
+              <a:schemeClr val="lt1"/>
+            </a:fontRef>
+          </p:style>
+          <p:txBody>
+            <a:bodyPr rtlCol="0" anchor="ctr"/>
+            <a:lstStyle/>
+            <a:p>
+              <a:pPr algn="ctr"/>
+              <a:endParaRPr lang="en-GB" dirty="0"/>
+            </a:p>
+          </p:txBody>
+        </p:sp>
+        <p:sp>
+          <p:nvSpPr>
+            <p:cNvPr id="12" name="Rectangle 11"/>
+            <p:cNvSpPr/>
+            <p:nvPr/>
+          </p:nvSpPr>
+          <p:spPr>
+            <a:xfrm>
+              <a:off x="5545182" y="1496786"/>
+              <a:ext cx="1632858" cy="613955"/>
+            </a:xfrm>
+            <a:prstGeom prst="rect">
+              <a:avLst/>
+            </a:prstGeom>
+          </p:spPr>
+          <p:style>
+            <a:lnRef idx="2">
+              <a:schemeClr val="accent1">
+                <a:shade val="50000"/>
+              </a:schemeClr>
+            </a:lnRef>
+            <a:fillRef idx="1">
+              <a:schemeClr val="accent1"/>
+            </a:fillRef>
+            <a:effectRef idx="0">
+              <a:schemeClr val="accent1"/>
+            </a:effectRef>
+            <a:fontRef idx="minor">
+              <a:schemeClr val="lt1"/>
+            </a:fontRef>
+          </p:style>
+          <p:txBody>
+            <a:bodyPr rtlCol="0" anchor="ctr"/>
+            <a:lstStyle/>
+            <a:p>
+              <a:pPr algn="ctr"/>
+              <a:endParaRPr lang="en-GB" dirty="0"/>
+            </a:p>
+          </p:txBody>
+        </p:sp>
+        <p:sp>
+          <p:nvSpPr>
+            <p:cNvPr id="13" name="Rectangle 12"/>
+            <p:cNvSpPr/>
+            <p:nvPr/>
+          </p:nvSpPr>
+          <p:spPr>
+            <a:xfrm>
+              <a:off x="5488578" y="1589315"/>
+              <a:ext cx="1632858" cy="613955"/>
+            </a:xfrm>
+            <a:prstGeom prst="rect">
+              <a:avLst/>
+            </a:prstGeom>
+          </p:spPr>
+          <p:style>
+            <a:lnRef idx="2">
+              <a:schemeClr val="accent1">
+                <a:shade val="50000"/>
+              </a:schemeClr>
+            </a:lnRef>
+            <a:fillRef idx="1">
+              <a:schemeClr val="accent1"/>
+            </a:fillRef>
+            <a:effectRef idx="0">
+              <a:schemeClr val="accent1"/>
+            </a:effectRef>
+            <a:fontRef idx="minor">
+              <a:schemeClr val="lt1"/>
+            </a:fontRef>
+          </p:style>
+          <p:txBody>
+            <a:bodyPr rtlCol="0" anchor="ctr"/>
+            <a:lstStyle/>
+            <a:p>
+              <a:pPr algn="ctr"/>
+              <a:r>
+                <a:rPr lang="en-GB" dirty="0" smtClean="0"/>
+                <a:t>Business Service</a:t>
+              </a:r>
+              <a:endParaRPr lang="en-GB" dirty="0"/>
+            </a:p>
+          </p:txBody>
+        </p:sp>
+      </p:grpSp>
+      <p:grpSp>
+        <p:nvGrpSpPr>
+          <p:cNvPr id="14" name="Group 13"/>
+          <p:cNvGrpSpPr/>
+          <p:nvPr/>
+        </p:nvGrpSpPr>
+        <p:grpSpPr>
+          <a:xfrm>
+            <a:off x="4089369" y="2023111"/>
+            <a:ext cx="1356359" cy="785950"/>
+            <a:chOff x="5488578" y="1417320"/>
+            <a:chExt cx="1746066" cy="785950"/>
+          </a:xfrm>
+        </p:grpSpPr>
+        <p:sp>
+          <p:nvSpPr>
+            <p:cNvPr id="15" name="Rectangle 14"/>
+            <p:cNvSpPr/>
+            <p:nvPr/>
+          </p:nvSpPr>
+          <p:spPr>
+            <a:xfrm>
+              <a:off x="5601786" y="1417320"/>
+              <a:ext cx="1632858" cy="613955"/>
+            </a:xfrm>
+            <a:prstGeom prst="rect">
+              <a:avLst/>
+            </a:prstGeom>
+          </p:spPr>
+          <p:style>
+            <a:lnRef idx="2">
+              <a:schemeClr val="accent1">
+                <a:shade val="50000"/>
+              </a:schemeClr>
+            </a:lnRef>
+            <a:fillRef idx="1">
+              <a:schemeClr val="accent1"/>
+            </a:fillRef>
+            <a:effectRef idx="0">
+              <a:schemeClr val="accent1"/>
+            </a:effectRef>
+            <a:fontRef idx="minor">
+              <a:schemeClr val="lt1"/>
+            </a:fontRef>
+          </p:style>
+          <p:txBody>
+            <a:bodyPr rtlCol="0" anchor="ctr"/>
+            <a:lstStyle/>
+            <a:p>
+              <a:pPr algn="ctr"/>
+              <a:endParaRPr lang="en-GB" dirty="0"/>
+            </a:p>
+          </p:txBody>
+        </p:sp>
+        <p:sp>
+          <p:nvSpPr>
+            <p:cNvPr id="16" name="Rectangle 15"/>
+            <p:cNvSpPr/>
+            <p:nvPr/>
+          </p:nvSpPr>
+          <p:spPr>
+            <a:xfrm>
+              <a:off x="5545182" y="1496786"/>
+              <a:ext cx="1632858" cy="613955"/>
+            </a:xfrm>
+            <a:prstGeom prst="rect">
+              <a:avLst/>
+            </a:prstGeom>
+          </p:spPr>
+          <p:style>
+            <a:lnRef idx="2">
+              <a:schemeClr val="accent1">
+                <a:shade val="50000"/>
+              </a:schemeClr>
+            </a:lnRef>
+            <a:fillRef idx="1">
+              <a:schemeClr val="accent1"/>
+            </a:fillRef>
+            <a:effectRef idx="0">
+              <a:schemeClr val="accent1"/>
+            </a:effectRef>
+            <a:fontRef idx="minor">
+              <a:schemeClr val="lt1"/>
+            </a:fontRef>
+          </p:style>
+          <p:txBody>
+            <a:bodyPr rtlCol="0" anchor="ctr"/>
+            <a:lstStyle/>
+            <a:p>
+              <a:pPr algn="ctr"/>
+              <a:endParaRPr lang="en-GB" dirty="0"/>
+            </a:p>
+          </p:txBody>
+        </p:sp>
+        <p:sp>
+          <p:nvSpPr>
+            <p:cNvPr id="17" name="Rectangle 16"/>
+            <p:cNvSpPr/>
+            <p:nvPr/>
+          </p:nvSpPr>
+          <p:spPr>
+            <a:xfrm>
+              <a:off x="5488578" y="1589315"/>
+              <a:ext cx="1632858" cy="613955"/>
+            </a:xfrm>
+            <a:prstGeom prst="rect">
+              <a:avLst/>
+            </a:prstGeom>
+          </p:spPr>
+          <p:style>
+            <a:lnRef idx="2">
+              <a:schemeClr val="accent1">
+                <a:shade val="50000"/>
+              </a:schemeClr>
+            </a:lnRef>
+            <a:fillRef idx="1">
+              <a:schemeClr val="accent1"/>
+            </a:fillRef>
+            <a:effectRef idx="0">
+              <a:schemeClr val="accent1"/>
+            </a:effectRef>
+            <a:fontRef idx="minor">
+              <a:schemeClr val="lt1"/>
+            </a:fontRef>
+          </p:style>
+          <p:txBody>
+            <a:bodyPr rtlCol="0" anchor="ctr"/>
+            <a:lstStyle/>
+            <a:p>
+              <a:pPr algn="ctr"/>
+              <a:r>
+                <a:rPr lang="en-GB" dirty="0" smtClean="0"/>
+                <a:t>Business Service</a:t>
+              </a:r>
+              <a:endParaRPr lang="en-GB" dirty="0"/>
+            </a:p>
+          </p:txBody>
+        </p:sp>
+      </p:grpSp>
+      <p:cxnSp>
+        <p:nvCxnSpPr>
+          <p:cNvPr id="20" name="Elbow Connector 19"/>
+          <p:cNvCxnSpPr>
+            <a:stCxn id="5" idx="2"/>
+            <a:endCxn id="8" idx="0"/>
+          </p:cNvCxnSpPr>
+          <p:nvPr/>
+        </p:nvCxnSpPr>
+        <p:spPr>
+          <a:xfrm rot="5400000">
+            <a:off x="2103915" y="1011305"/>
+            <a:ext cx="522242" cy="1660302"/>
+          </a:xfrm>
+          <a:prstGeom prst="bentConnector3">
+            <a:avLst/>
+          </a:prstGeom>
+          <a:ln w="38100">
+            <a:solidFill>
+              <a:schemeClr val="accent1">
+                <a:lumMod val="50000"/>
+              </a:schemeClr>
+            </a:solidFill>
+            <a:tailEnd type="triangle"/>
+          </a:ln>
+        </p:spPr>
+        <p:style>
+          <a:lnRef idx="1">
+            <a:schemeClr val="accent1"/>
+          </a:lnRef>
+          <a:fillRef idx="0">
+            <a:schemeClr val="accent1"/>
+          </a:fillRef>
+          <a:effectRef idx="0">
+            <a:schemeClr val="accent1"/>
+          </a:effectRef>
+          <a:fontRef idx="minor">
+            <a:schemeClr val="tx1"/>
+          </a:fontRef>
+        </p:style>
+      </p:cxnSp>
+      <p:cxnSp>
+        <p:nvCxnSpPr>
+          <p:cNvPr id="22" name="Elbow Connector 21"/>
+          <p:cNvCxnSpPr>
+            <a:stCxn id="5" idx="2"/>
+            <a:endCxn id="12" idx="0"/>
+          </p:cNvCxnSpPr>
+          <p:nvPr/>
+        </p:nvCxnSpPr>
+        <p:spPr>
+          <a:xfrm rot="5400000">
+            <a:off x="2931675" y="1839065"/>
+            <a:ext cx="522242" cy="4782"/>
+          </a:xfrm>
+          <a:prstGeom prst="bentConnector3">
+            <a:avLst/>
+          </a:prstGeom>
+          <a:ln w="38100">
+            <a:solidFill>
+              <a:schemeClr val="accent1">
+                <a:lumMod val="50000"/>
+              </a:schemeClr>
+            </a:solidFill>
+            <a:tailEnd type="triangle"/>
+          </a:ln>
+        </p:spPr>
+        <p:style>
+          <a:lnRef idx="1">
+            <a:schemeClr val="accent1"/>
+          </a:lnRef>
+          <a:fillRef idx="0">
+            <a:schemeClr val="accent1"/>
+          </a:fillRef>
+          <a:effectRef idx="0">
+            <a:schemeClr val="accent1"/>
+          </a:effectRef>
+          <a:fontRef idx="minor">
+            <a:schemeClr val="tx1"/>
+          </a:fontRef>
+        </p:style>
+      </p:cxnSp>
+      <p:cxnSp>
+        <p:nvCxnSpPr>
+          <p:cNvPr id="25" name="Elbow Connector 24"/>
+          <p:cNvCxnSpPr>
+            <a:stCxn id="5" idx="2"/>
+            <a:endCxn id="16" idx="0"/>
+          </p:cNvCxnSpPr>
+          <p:nvPr/>
+        </p:nvCxnSpPr>
+        <p:spPr>
+          <a:xfrm rot="16200000" flipH="1">
+            <a:off x="3720246" y="1055275"/>
+            <a:ext cx="522242" cy="1572361"/>
+          </a:xfrm>
+          <a:prstGeom prst="bentConnector3">
+            <a:avLst>
+              <a:gd name="adj1" fmla="val 50000"/>
+            </a:avLst>
+          </a:prstGeom>
+          <a:ln w="38100">
+            <a:solidFill>
+              <a:schemeClr val="accent1">
+                <a:lumMod val="50000"/>
+              </a:schemeClr>
+            </a:solidFill>
+            <a:tailEnd type="triangle"/>
+          </a:ln>
+        </p:spPr>
+        <p:style>
+          <a:lnRef idx="1">
+            <a:schemeClr val="accent1"/>
+          </a:lnRef>
+          <a:fillRef idx="0">
+            <a:schemeClr val="accent1"/>
+          </a:fillRef>
+          <a:effectRef idx="0">
+            <a:schemeClr val="accent1"/>
+          </a:effectRef>
+          <a:fontRef idx="minor">
+            <a:schemeClr val="tx1"/>
+          </a:fontRef>
+        </p:style>
+      </p:cxnSp>
+      <p:grpSp>
+        <p:nvGrpSpPr>
+          <p:cNvPr id="42" name="Group 41"/>
+          <p:cNvGrpSpPr/>
+          <p:nvPr/>
+        </p:nvGrpSpPr>
+        <p:grpSpPr>
+          <a:xfrm>
+            <a:off x="6960851" y="398215"/>
+            <a:ext cx="2160000" cy="1449842"/>
+            <a:chOff x="6960851" y="398215"/>
+            <a:chExt cx="2160000" cy="1449842"/>
+          </a:xfrm>
+        </p:grpSpPr>
+        <p:sp>
+          <p:nvSpPr>
+            <p:cNvPr id="29" name="Rectangle 28"/>
+            <p:cNvSpPr/>
+            <p:nvPr/>
+          </p:nvSpPr>
+          <p:spPr>
+            <a:xfrm>
+              <a:off x="6960851" y="398215"/>
+              <a:ext cx="2160000" cy="1449842"/>
+            </a:xfrm>
+            <a:prstGeom prst="rect">
+              <a:avLst/>
+            </a:prstGeom>
+            <a:solidFill>
+              <a:schemeClr val="accent1">
+                <a:lumMod val="20000"/>
+                <a:lumOff val="80000"/>
+              </a:schemeClr>
+            </a:solidFill>
+          </p:spPr>
+          <p:style>
+            <a:lnRef idx="2">
+              <a:schemeClr val="accent1">
+                <a:shade val="50000"/>
+              </a:schemeClr>
+            </a:lnRef>
+            <a:fillRef idx="1">
+              <a:schemeClr val="accent1"/>
+            </a:fillRef>
+            <a:effectRef idx="0">
+              <a:schemeClr val="accent1"/>
+            </a:effectRef>
+            <a:fontRef idx="minor">
+              <a:schemeClr val="lt1"/>
+            </a:fontRef>
+          </p:style>
+          <p:txBody>
+            <a:bodyPr rtlCol="0" anchor="t"/>
+            <a:lstStyle/>
+            <a:p>
+              <a:pPr algn="ctr"/>
+              <a:r>
+                <a:rPr lang="en-GB" dirty="0" smtClean="0">
+                  <a:solidFill>
+                    <a:schemeClr val="tx1"/>
+                  </a:solidFill>
+                </a:rPr>
+                <a:t>End User Device</a:t>
+              </a:r>
+              <a:endParaRPr lang="en-GB" dirty="0">
+                <a:solidFill>
+                  <a:schemeClr val="tx1"/>
+                </a:solidFill>
+              </a:endParaRPr>
+            </a:p>
+          </p:txBody>
+        </p:sp>
+        <p:sp>
+          <p:nvSpPr>
+            <p:cNvPr id="28" name="Rectangle 27"/>
+            <p:cNvSpPr/>
+            <p:nvPr/>
+          </p:nvSpPr>
+          <p:spPr>
+            <a:xfrm>
+              <a:off x="7448966" y="834731"/>
+              <a:ext cx="1183771" cy="883244"/>
+            </a:xfrm>
+            <a:prstGeom prst="rect">
+              <a:avLst/>
+            </a:prstGeom>
+          </p:spPr>
+          <p:style>
+            <a:lnRef idx="2">
+              <a:schemeClr val="accent1">
+                <a:shade val="50000"/>
+              </a:schemeClr>
+            </a:lnRef>
+            <a:fillRef idx="1">
+              <a:schemeClr val="accent1"/>
+            </a:fillRef>
+            <a:effectRef idx="0">
+              <a:schemeClr val="accent1"/>
+            </a:effectRef>
+            <a:fontRef idx="minor">
+              <a:schemeClr val="lt1"/>
+            </a:fontRef>
+          </p:style>
+          <p:txBody>
+            <a:bodyPr rtlCol="0" anchor="ctr"/>
+            <a:lstStyle/>
+            <a:p>
+              <a:pPr algn="ctr"/>
+              <a:r>
+                <a:rPr lang="en-GB" dirty="0" smtClean="0"/>
+                <a:t>Consumer App</a:t>
+              </a:r>
+              <a:endParaRPr lang="en-GB" dirty="0"/>
+            </a:p>
+          </p:txBody>
+        </p:sp>
+      </p:grpSp>
+      <p:cxnSp>
+        <p:nvCxnSpPr>
+          <p:cNvPr id="32" name="Straight Arrow Connector 31"/>
+          <p:cNvCxnSpPr>
+            <a:stCxn id="28" idx="1"/>
+            <a:endCxn id="5" idx="3"/>
+          </p:cNvCxnSpPr>
+          <p:nvPr/>
+        </p:nvCxnSpPr>
+        <p:spPr>
+          <a:xfrm flipH="1" flipV="1">
+            <a:off x="4011616" y="1273358"/>
+            <a:ext cx="3437350" cy="2995"/>
+          </a:xfrm>
+          <a:prstGeom prst="straightConnector1">
+            <a:avLst/>
+          </a:prstGeom>
+          <a:ln w="28575">
+            <a:tailEnd type="triangle"/>
+          </a:ln>
+        </p:spPr>
+        <p:style>
+          <a:lnRef idx="1">
+            <a:schemeClr val="accent1"/>
+          </a:lnRef>
+          <a:fillRef idx="0">
+            <a:schemeClr val="accent1"/>
+          </a:fillRef>
+          <a:effectRef idx="0">
+            <a:schemeClr val="accent1"/>
+          </a:effectRef>
+          <a:fontRef idx="minor">
+            <a:schemeClr val="tx1"/>
+          </a:fontRef>
+        </p:style>
+      </p:cxnSp>
+      <p:sp>
+        <p:nvSpPr>
+          <p:cNvPr id="33" name="TextBox 32"/>
+          <p:cNvSpPr txBox="1"/>
+          <p:nvPr/>
+        </p:nvSpPr>
+        <p:spPr>
+          <a:xfrm>
+            <a:off x="113034" y="123351"/>
+            <a:ext cx="4200061" cy="369332"/>
+          </a:xfrm>
+          <a:prstGeom prst="rect">
+            <a:avLst/>
+          </a:prstGeom>
+          <a:noFill/>
+        </p:spPr>
+        <p:txBody>
+          <a:bodyPr wrap="none" rtlCol="0">
+            <a:spAutoFit/>
+          </a:bodyPr>
+          <a:lstStyle/>
+          <a:p>
+            <a:r>
+              <a:rPr lang="en-GB" dirty="0" smtClean="0"/>
+              <a:t>Original Architecture – Redundant Services</a:t>
+            </a:r>
+            <a:endParaRPr lang="en-GB" dirty="0"/>
+          </a:p>
+        </p:txBody>
+      </p:sp>
+      <p:sp>
+        <p:nvSpPr>
+          <p:cNvPr id="34" name="Rectangle 33"/>
+          <p:cNvSpPr/>
+          <p:nvPr/>
+        </p:nvSpPr>
+        <p:spPr>
+          <a:xfrm>
+            <a:off x="527332" y="5051887"/>
+            <a:ext cx="5238206" cy="1296000"/>
+          </a:xfrm>
+          <a:prstGeom prst="rect">
+            <a:avLst/>
+          </a:prstGeom>
+          <a:solidFill>
+            <a:schemeClr val="accent1">
+              <a:lumMod val="20000"/>
+              <a:lumOff val="80000"/>
+            </a:schemeClr>
+          </a:solidFill>
+        </p:spPr>
+        <p:style>
+          <a:lnRef idx="2">
+            <a:schemeClr val="accent1">
+              <a:shade val="50000"/>
+            </a:schemeClr>
+          </a:lnRef>
+          <a:fillRef idx="1">
+            <a:schemeClr val="accent1"/>
+          </a:fillRef>
+          <a:effectRef idx="0">
+            <a:schemeClr val="accent1"/>
+          </a:effectRef>
+          <a:fontRef idx="minor">
+            <a:schemeClr val="lt1"/>
+          </a:fontRef>
+        </p:style>
+        <p:txBody>
+          <a:bodyPr rtlCol="0" anchor="t"/>
+          <a:lstStyle/>
+          <a:p>
+            <a:r>
+              <a:rPr lang="en-GB" dirty="0" smtClean="0">
+                <a:solidFill>
+                  <a:schemeClr val="tx1"/>
+                </a:solidFill>
+              </a:rPr>
+              <a:t>Data Centre B – Non-Transactional Services</a:t>
+            </a:r>
+            <a:endParaRPr lang="en-GB" dirty="0">
+              <a:solidFill>
+                <a:schemeClr val="tx1"/>
+              </a:solidFill>
+            </a:endParaRPr>
+          </a:p>
+        </p:txBody>
+      </p:sp>
+      <p:sp>
+        <p:nvSpPr>
+          <p:cNvPr id="35" name="Rectangle 34"/>
+          <p:cNvSpPr/>
+          <p:nvPr/>
+        </p:nvSpPr>
+        <p:spPr>
+          <a:xfrm>
+            <a:off x="527332" y="3663926"/>
+            <a:ext cx="5238206" cy="1296000"/>
+          </a:xfrm>
+          <a:prstGeom prst="rect">
+            <a:avLst/>
+          </a:prstGeom>
+          <a:solidFill>
+            <a:schemeClr val="accent1">
+              <a:lumMod val="20000"/>
+              <a:lumOff val="80000"/>
+            </a:schemeClr>
+          </a:solidFill>
+        </p:spPr>
+        <p:style>
+          <a:lnRef idx="2">
+            <a:schemeClr val="accent1">
+              <a:shade val="50000"/>
+            </a:schemeClr>
+          </a:lnRef>
+          <a:fillRef idx="1">
+            <a:schemeClr val="accent1"/>
+          </a:fillRef>
+          <a:effectRef idx="0">
+            <a:schemeClr val="accent1"/>
+          </a:effectRef>
+          <a:fontRef idx="minor">
+            <a:schemeClr val="lt1"/>
+          </a:fontRef>
+        </p:style>
+        <p:txBody>
+          <a:bodyPr rtlCol="0" anchor="t"/>
+          <a:lstStyle/>
+          <a:p>
+            <a:r>
+              <a:rPr lang="en-GB" dirty="0" smtClean="0">
+                <a:solidFill>
+                  <a:schemeClr val="tx1"/>
+                </a:solidFill>
+              </a:rPr>
+              <a:t>Data Centre A –Transactional Services</a:t>
+            </a:r>
+            <a:endParaRPr lang="en-GB" dirty="0">
+              <a:solidFill>
+                <a:schemeClr val="tx1"/>
+              </a:solidFill>
+            </a:endParaRPr>
+          </a:p>
+        </p:txBody>
+      </p:sp>
+      <p:grpSp>
+        <p:nvGrpSpPr>
+          <p:cNvPr id="43" name="Group 42"/>
+          <p:cNvGrpSpPr/>
+          <p:nvPr/>
+        </p:nvGrpSpPr>
+        <p:grpSpPr>
+          <a:xfrm>
+            <a:off x="6960851" y="4193077"/>
+            <a:ext cx="2160000" cy="1449842"/>
+            <a:chOff x="6960851" y="4193077"/>
+            <a:chExt cx="2160000" cy="1449842"/>
+          </a:xfrm>
+        </p:grpSpPr>
+        <p:sp>
+          <p:nvSpPr>
+            <p:cNvPr id="37" name="Rectangle 36"/>
+            <p:cNvSpPr/>
+            <p:nvPr/>
+          </p:nvSpPr>
+          <p:spPr>
+            <a:xfrm>
+              <a:off x="6960851" y="4193077"/>
+              <a:ext cx="2160000" cy="1449842"/>
+            </a:xfrm>
+            <a:prstGeom prst="rect">
+              <a:avLst/>
+            </a:prstGeom>
+            <a:solidFill>
+              <a:schemeClr val="accent1">
+                <a:lumMod val="20000"/>
+                <a:lumOff val="80000"/>
+              </a:schemeClr>
+            </a:solidFill>
+          </p:spPr>
+          <p:style>
+            <a:lnRef idx="2">
+              <a:schemeClr val="accent1">
+                <a:shade val="50000"/>
+              </a:schemeClr>
+            </a:lnRef>
+            <a:fillRef idx="1">
+              <a:schemeClr val="accent1"/>
+            </a:fillRef>
+            <a:effectRef idx="0">
+              <a:schemeClr val="accent1"/>
+            </a:effectRef>
+            <a:fontRef idx="minor">
+              <a:schemeClr val="lt1"/>
+            </a:fontRef>
+          </p:style>
+          <p:txBody>
+            <a:bodyPr rtlCol="0" anchor="t"/>
+            <a:lstStyle/>
+            <a:p>
+              <a:pPr algn="ctr"/>
+              <a:r>
+                <a:rPr lang="en-GB" dirty="0" smtClean="0">
+                  <a:solidFill>
+                    <a:schemeClr val="tx1"/>
+                  </a:solidFill>
+                </a:rPr>
+                <a:t>End User Device</a:t>
+              </a:r>
+              <a:endParaRPr lang="en-GB" dirty="0">
+                <a:solidFill>
+                  <a:schemeClr val="tx1"/>
+                </a:solidFill>
+              </a:endParaRPr>
+            </a:p>
+          </p:txBody>
+        </p:sp>
+        <p:grpSp>
+          <p:nvGrpSpPr>
+            <p:cNvPr id="40" name="Group 39"/>
+            <p:cNvGrpSpPr/>
+            <p:nvPr/>
+          </p:nvGrpSpPr>
+          <p:grpSpPr>
+            <a:xfrm>
+              <a:off x="7154230" y="4610265"/>
+              <a:ext cx="1773242" cy="883244"/>
+              <a:chOff x="7726393" y="5838612"/>
+              <a:chExt cx="1773242" cy="883244"/>
+            </a:xfrm>
+          </p:grpSpPr>
+          <p:sp>
+            <p:nvSpPr>
+              <p:cNvPr id="38" name="Rectangle 37"/>
+              <p:cNvSpPr/>
+              <p:nvPr/>
+            </p:nvSpPr>
+            <p:spPr>
+              <a:xfrm>
+                <a:off x="8315864" y="5838612"/>
+                <a:ext cx="1183771" cy="883244"/>
+              </a:xfrm>
+              <a:prstGeom prst="rect">
+                <a:avLst/>
+              </a:prstGeom>
+            </p:spPr>
+            <p:style>
+              <a:lnRef idx="2">
+                <a:schemeClr val="accent1">
+                  <a:shade val="50000"/>
+                </a:schemeClr>
+              </a:lnRef>
+              <a:fillRef idx="1">
+                <a:schemeClr val="accent1"/>
+              </a:fillRef>
+              <a:effectRef idx="0">
+                <a:schemeClr val="accent1"/>
+              </a:effectRef>
+              <a:fontRef idx="minor">
+                <a:schemeClr val="lt1"/>
+              </a:fontRef>
+            </p:style>
+            <p:txBody>
+              <a:bodyPr rtlCol="0" anchor="ctr"/>
+              <a:lstStyle/>
+              <a:p>
+                <a:pPr algn="ctr"/>
+                <a:r>
+                  <a:rPr lang="en-GB" dirty="0" smtClean="0"/>
+                  <a:t>Consumer App</a:t>
+                </a:r>
+                <a:endParaRPr lang="en-GB" dirty="0"/>
+              </a:p>
+            </p:txBody>
+          </p:sp>
+          <p:sp>
+            <p:nvSpPr>
+              <p:cNvPr id="39" name="Rectangle 38"/>
+              <p:cNvSpPr/>
+              <p:nvPr/>
+            </p:nvSpPr>
+            <p:spPr>
+              <a:xfrm>
+                <a:off x="7726393" y="5838612"/>
+                <a:ext cx="589471" cy="883244"/>
+              </a:xfrm>
+              <a:prstGeom prst="rect">
+                <a:avLst/>
+              </a:prstGeom>
+            </p:spPr>
+            <p:style>
+              <a:lnRef idx="2">
+                <a:schemeClr val="accent1">
+                  <a:shade val="50000"/>
+                </a:schemeClr>
+              </a:lnRef>
+              <a:fillRef idx="1">
+                <a:schemeClr val="accent1"/>
+              </a:fillRef>
+              <a:effectRef idx="0">
+                <a:schemeClr val="accent1"/>
+              </a:effectRef>
+              <a:fontRef idx="minor">
+                <a:schemeClr val="lt1"/>
+              </a:fontRef>
+            </p:style>
+            <p:txBody>
+              <a:bodyPr vert="vert270" rtlCol="0" anchor="ctr"/>
+              <a:lstStyle/>
+              <a:p>
+                <a:pPr algn="ctr"/>
+                <a:r>
+                  <a:rPr lang="en-GB" dirty="0" smtClean="0"/>
+                  <a:t>Request Proxy</a:t>
+                </a:r>
+                <a:endParaRPr lang="en-GB" dirty="0"/>
+              </a:p>
+            </p:txBody>
+          </p:sp>
+        </p:grpSp>
+      </p:grpSp>
+      <p:sp>
+        <p:nvSpPr>
+          <p:cNvPr id="49" name="Rectangle 48"/>
+          <p:cNvSpPr/>
+          <p:nvPr/>
+        </p:nvSpPr>
+        <p:spPr>
+          <a:xfrm>
+            <a:off x="3316910" y="4132381"/>
+            <a:ext cx="1632858" cy="613955"/>
+          </a:xfrm>
+          <a:prstGeom prst="rect">
+            <a:avLst/>
+          </a:prstGeom>
+        </p:spPr>
+        <p:style>
+          <a:lnRef idx="2">
+            <a:schemeClr val="accent1">
+              <a:shade val="50000"/>
+            </a:schemeClr>
+          </a:lnRef>
+          <a:fillRef idx="1">
+            <a:schemeClr val="accent1"/>
+          </a:fillRef>
+          <a:effectRef idx="0">
+            <a:schemeClr val="accent1"/>
+          </a:effectRef>
+          <a:fontRef idx="minor">
+            <a:schemeClr val="lt1"/>
+          </a:fontRef>
+        </p:style>
+        <p:txBody>
+          <a:bodyPr rtlCol="0" anchor="ctr"/>
+          <a:lstStyle/>
+          <a:p>
+            <a:pPr algn="ctr"/>
+            <a:r>
+              <a:rPr lang="en-GB" dirty="0" smtClean="0"/>
+              <a:t>Request Handler</a:t>
+            </a:r>
+            <a:endParaRPr lang="en-GB" dirty="0"/>
+          </a:p>
+        </p:txBody>
+      </p:sp>
+      <p:sp>
+        <p:nvSpPr>
+          <p:cNvPr id="52" name="TextBox 51"/>
+          <p:cNvSpPr txBox="1"/>
+          <p:nvPr/>
+        </p:nvSpPr>
+        <p:spPr>
+          <a:xfrm>
+            <a:off x="113034" y="6439643"/>
+            <a:ext cx="5029647" cy="369332"/>
+          </a:xfrm>
+          <a:prstGeom prst="rect">
+            <a:avLst/>
+          </a:prstGeom>
+          <a:noFill/>
+        </p:spPr>
+        <p:txBody>
+          <a:bodyPr wrap="none" rtlCol="0">
+            <a:spAutoFit/>
+          </a:bodyPr>
+          <a:lstStyle/>
+          <a:p>
+            <a:r>
+              <a:rPr lang="en-GB" dirty="0" smtClean="0"/>
+              <a:t>Revised Architecture – Limited Service Redundancy </a:t>
+            </a:r>
+            <a:endParaRPr lang="en-GB" dirty="0"/>
+          </a:p>
+        </p:txBody>
+      </p:sp>
+      <p:sp>
+        <p:nvSpPr>
+          <p:cNvPr id="56" name="Rectangle 55"/>
+          <p:cNvSpPr/>
+          <p:nvPr/>
+        </p:nvSpPr>
+        <p:spPr>
+          <a:xfrm>
+            <a:off x="894827" y="5439789"/>
+            <a:ext cx="1679421" cy="613955"/>
+          </a:xfrm>
+          <a:prstGeom prst="rect">
+            <a:avLst/>
+          </a:prstGeom>
+        </p:spPr>
+        <p:style>
+          <a:lnRef idx="2">
+            <a:schemeClr val="accent1">
+              <a:shade val="50000"/>
+            </a:schemeClr>
+          </a:lnRef>
+          <a:fillRef idx="1">
+            <a:schemeClr val="accent1"/>
+          </a:fillRef>
+          <a:effectRef idx="0">
+            <a:schemeClr val="accent1"/>
+          </a:effectRef>
+          <a:fontRef idx="minor">
+            <a:schemeClr val="lt1"/>
+          </a:fontRef>
+        </p:style>
+        <p:txBody>
+          <a:bodyPr rtlCol="0" anchor="ctr"/>
+          <a:lstStyle/>
+          <a:p>
+            <a:pPr algn="ctr"/>
+            <a:r>
+              <a:rPr lang="en-GB" dirty="0" smtClean="0"/>
+              <a:t>Non-Redundant Service</a:t>
+            </a:r>
+            <a:endParaRPr lang="en-GB" dirty="0"/>
+          </a:p>
+        </p:txBody>
+      </p:sp>
+      <p:grpSp>
+        <p:nvGrpSpPr>
+          <p:cNvPr id="57" name="Group 56"/>
+          <p:cNvGrpSpPr/>
+          <p:nvPr/>
+        </p:nvGrpSpPr>
+        <p:grpSpPr>
+          <a:xfrm>
+            <a:off x="649025" y="4057105"/>
+            <a:ext cx="1734763" cy="785950"/>
+            <a:chOff x="5488578" y="1417320"/>
+            <a:chExt cx="1746066" cy="785950"/>
+          </a:xfrm>
+        </p:grpSpPr>
+        <p:sp>
+          <p:nvSpPr>
+            <p:cNvPr id="58" name="Rectangle 57"/>
+            <p:cNvSpPr/>
+            <p:nvPr/>
+          </p:nvSpPr>
+          <p:spPr>
+            <a:xfrm>
+              <a:off x="5601786" y="1417320"/>
+              <a:ext cx="1632858" cy="613955"/>
+            </a:xfrm>
+            <a:prstGeom prst="rect">
+              <a:avLst/>
+            </a:prstGeom>
+          </p:spPr>
+          <p:style>
+            <a:lnRef idx="2">
+              <a:schemeClr val="accent1">
+                <a:shade val="50000"/>
+              </a:schemeClr>
+            </a:lnRef>
+            <a:fillRef idx="1">
+              <a:schemeClr val="accent1"/>
+            </a:fillRef>
+            <a:effectRef idx="0">
+              <a:schemeClr val="accent1"/>
+            </a:effectRef>
+            <a:fontRef idx="minor">
+              <a:schemeClr val="lt1"/>
+            </a:fontRef>
+          </p:style>
+          <p:txBody>
+            <a:bodyPr rtlCol="0" anchor="ctr"/>
+            <a:lstStyle/>
+            <a:p>
+              <a:pPr algn="ctr"/>
+              <a:endParaRPr lang="en-GB" dirty="0"/>
+            </a:p>
+          </p:txBody>
+        </p:sp>
+        <p:sp>
+          <p:nvSpPr>
+            <p:cNvPr id="59" name="Rectangle 58"/>
+            <p:cNvSpPr/>
+            <p:nvPr/>
+          </p:nvSpPr>
+          <p:spPr>
+            <a:xfrm>
+              <a:off x="5545182" y="1496786"/>
+              <a:ext cx="1632858" cy="613955"/>
+            </a:xfrm>
+            <a:prstGeom prst="rect">
+              <a:avLst/>
+            </a:prstGeom>
+          </p:spPr>
+          <p:style>
+            <a:lnRef idx="2">
+              <a:schemeClr val="accent1">
+                <a:shade val="50000"/>
+              </a:schemeClr>
+            </a:lnRef>
+            <a:fillRef idx="1">
+              <a:schemeClr val="accent1"/>
+            </a:fillRef>
+            <a:effectRef idx="0">
+              <a:schemeClr val="accent1"/>
+            </a:effectRef>
+            <a:fontRef idx="minor">
+              <a:schemeClr val="lt1"/>
+            </a:fontRef>
+          </p:style>
+          <p:txBody>
+            <a:bodyPr rtlCol="0" anchor="ctr"/>
+            <a:lstStyle/>
+            <a:p>
+              <a:pPr algn="ctr"/>
+              <a:endParaRPr lang="en-GB" dirty="0"/>
+            </a:p>
+          </p:txBody>
+        </p:sp>
+        <p:sp>
+          <p:nvSpPr>
+            <p:cNvPr id="60" name="Rectangle 59"/>
+            <p:cNvSpPr/>
+            <p:nvPr/>
+          </p:nvSpPr>
+          <p:spPr>
+            <a:xfrm>
+              <a:off x="5488578" y="1589315"/>
+              <a:ext cx="1632858" cy="613955"/>
+            </a:xfrm>
+            <a:prstGeom prst="rect">
+              <a:avLst/>
+            </a:prstGeom>
+          </p:spPr>
+          <p:style>
+            <a:lnRef idx="2">
+              <a:schemeClr val="accent1">
+                <a:shade val="50000"/>
+              </a:schemeClr>
+            </a:lnRef>
+            <a:fillRef idx="1">
+              <a:schemeClr val="accent1"/>
+            </a:fillRef>
+            <a:effectRef idx="0">
+              <a:schemeClr val="accent1"/>
+            </a:effectRef>
+            <a:fontRef idx="minor">
+              <a:schemeClr val="lt1"/>
+            </a:fontRef>
+          </p:style>
+          <p:txBody>
+            <a:bodyPr rtlCol="0" anchor="ctr"/>
+            <a:lstStyle/>
+            <a:p>
+              <a:pPr algn="ctr"/>
+              <a:r>
+                <a:rPr lang="en-GB" dirty="0" smtClean="0"/>
+                <a:t>Transactional </a:t>
+              </a:r>
+              <a:r>
+                <a:rPr lang="en-GB" dirty="0" smtClean="0"/>
+                <a:t>Service</a:t>
+              </a:r>
+              <a:endParaRPr lang="en-GB" dirty="0"/>
+            </a:p>
+          </p:txBody>
+        </p:sp>
+      </p:grpSp>
+      <p:cxnSp>
+        <p:nvCxnSpPr>
+          <p:cNvPr id="51" name="Straight Arrow Connector 50"/>
+          <p:cNvCxnSpPr>
+            <a:stCxn id="49" idx="1"/>
+            <a:endCxn id="59" idx="3"/>
+          </p:cNvCxnSpPr>
+          <p:nvPr/>
+        </p:nvCxnSpPr>
+        <p:spPr>
+          <a:xfrm flipH="1">
+            <a:off x="2327551" y="4439359"/>
+            <a:ext cx="989359" cy="4190"/>
+          </a:xfrm>
+          <a:prstGeom prst="straightConnector1">
+            <a:avLst/>
+          </a:prstGeom>
+          <a:ln w="28575">
+            <a:solidFill>
+              <a:schemeClr val="accent1">
+                <a:lumMod val="50000"/>
+              </a:schemeClr>
+            </a:solidFill>
+            <a:tailEnd type="triangle"/>
+          </a:ln>
+        </p:spPr>
+        <p:style>
+          <a:lnRef idx="1">
+            <a:schemeClr val="accent1"/>
+          </a:lnRef>
+          <a:fillRef idx="0">
+            <a:schemeClr val="accent1"/>
+          </a:fillRef>
+          <a:effectRef idx="0">
+            <a:schemeClr val="accent1"/>
+          </a:effectRef>
+          <a:fontRef idx="minor">
+            <a:schemeClr val="tx1"/>
+          </a:fontRef>
+        </p:style>
+      </p:cxnSp>
+      <p:cxnSp>
+        <p:nvCxnSpPr>
+          <p:cNvPr id="67" name="Straight Arrow Connector 66"/>
+          <p:cNvCxnSpPr>
+            <a:stCxn id="39" idx="1"/>
+            <a:endCxn id="49" idx="3"/>
+          </p:cNvCxnSpPr>
+          <p:nvPr/>
+        </p:nvCxnSpPr>
+        <p:spPr>
+          <a:xfrm flipH="1" flipV="1">
+            <a:off x="4949768" y="4439359"/>
+            <a:ext cx="2204462" cy="612528"/>
+          </a:xfrm>
+          <a:prstGeom prst="straightConnector1">
+            <a:avLst/>
+          </a:prstGeom>
+          <a:ln w="28575">
+            <a:tailEnd type="triangle"/>
+          </a:ln>
+        </p:spPr>
+        <p:style>
+          <a:lnRef idx="1">
+            <a:schemeClr val="accent1"/>
+          </a:lnRef>
+          <a:fillRef idx="0">
+            <a:schemeClr val="accent1"/>
+          </a:fillRef>
+          <a:effectRef idx="0">
+            <a:schemeClr val="accent1"/>
+          </a:effectRef>
+          <a:fontRef idx="minor">
+            <a:schemeClr val="tx1"/>
+          </a:fontRef>
+        </p:style>
+      </p:cxnSp>
+      <p:sp>
+        <p:nvSpPr>
+          <p:cNvPr id="68" name="Rectangle 67"/>
+          <p:cNvSpPr/>
+          <p:nvPr/>
+        </p:nvSpPr>
+        <p:spPr>
+          <a:xfrm>
+            <a:off x="3171905" y="5612098"/>
+            <a:ext cx="1679421" cy="613955"/>
+          </a:xfrm>
+          <a:prstGeom prst="rect">
+            <a:avLst/>
+          </a:prstGeom>
+        </p:spPr>
+        <p:style>
+          <a:lnRef idx="2">
+            <a:schemeClr val="accent1">
+              <a:shade val="50000"/>
+            </a:schemeClr>
+          </a:lnRef>
+          <a:fillRef idx="1">
+            <a:schemeClr val="accent1"/>
+          </a:fillRef>
+          <a:effectRef idx="0">
+            <a:schemeClr val="accent1"/>
+          </a:effectRef>
+          <a:fontRef idx="minor">
+            <a:schemeClr val="lt1"/>
+          </a:fontRef>
+        </p:style>
+        <p:txBody>
+          <a:bodyPr rtlCol="0" anchor="ctr"/>
+          <a:lstStyle/>
+          <a:p>
+            <a:pPr algn="ctr"/>
+            <a:r>
+              <a:rPr lang="en-GB" dirty="0" smtClean="0"/>
+              <a:t>Non-Redundant Service</a:t>
+            </a:r>
+            <a:endParaRPr lang="en-GB" dirty="0"/>
+          </a:p>
+        </p:txBody>
+      </p:sp>
+      <p:cxnSp>
+        <p:nvCxnSpPr>
+          <p:cNvPr id="69" name="Straight Arrow Connector 68"/>
+          <p:cNvCxnSpPr>
+            <a:stCxn id="39" idx="1"/>
+            <a:endCxn id="56" idx="3"/>
+          </p:cNvCxnSpPr>
+          <p:nvPr/>
+        </p:nvCxnSpPr>
+        <p:spPr>
+          <a:xfrm flipH="1">
+            <a:off x="2574248" y="5051887"/>
+            <a:ext cx="4579982" cy="694880"/>
+          </a:xfrm>
+          <a:prstGeom prst="straightConnector1">
+            <a:avLst/>
+          </a:prstGeom>
+          <a:ln w="28575">
+            <a:tailEnd type="triangle"/>
+          </a:ln>
+        </p:spPr>
+        <p:style>
+          <a:lnRef idx="1">
+            <a:schemeClr val="accent1"/>
+          </a:lnRef>
+          <a:fillRef idx="0">
+            <a:schemeClr val="accent1"/>
+          </a:fillRef>
+          <a:effectRef idx="0">
+            <a:schemeClr val="accent1"/>
+          </a:effectRef>
+          <a:fontRef idx="minor">
+            <a:schemeClr val="tx1"/>
+          </a:fontRef>
+        </p:style>
+      </p:cxnSp>
+      <p:cxnSp>
+        <p:nvCxnSpPr>
+          <p:cNvPr id="72" name="Straight Arrow Connector 71"/>
+          <p:cNvCxnSpPr>
+            <a:stCxn id="39" idx="1"/>
+            <a:endCxn id="68" idx="3"/>
+          </p:cNvCxnSpPr>
+          <p:nvPr/>
+        </p:nvCxnSpPr>
+        <p:spPr>
+          <a:xfrm flipH="1">
+            <a:off x="4851326" y="5051887"/>
+            <a:ext cx="2302904" cy="867189"/>
+          </a:xfrm>
+          <a:prstGeom prst="straightConnector1">
+            <a:avLst/>
+          </a:prstGeom>
+          <a:ln w="28575">
+            <a:tailEnd type="triangle"/>
+          </a:ln>
+        </p:spPr>
+        <p:style>
+          <a:lnRef idx="1">
+            <a:schemeClr val="accent1"/>
+          </a:lnRef>
+          <a:fillRef idx="0">
+            <a:schemeClr val="accent1"/>
+          </a:fillRef>
+          <a:effectRef idx="0">
+            <a:schemeClr val="accent1"/>
+          </a:effectRef>
+          <a:fontRef idx="minor">
+            <a:schemeClr val="tx1"/>
+          </a:fontRef>
+        </p:style>
+      </p:cxnSp>
+    </p:spTree>
+    <p:extLst>
+      <p:ext uri="{BB962C8B-B14F-4D97-AF65-F5344CB8AC3E}">
+        <p14:creationId xmlns:p14="http://schemas.microsoft.com/office/powerpoint/2010/main" val="2796352060"/>
+      </p:ext>
+    </p:extLst>
+  </p:cSld>
+  <p:clrMapOvr>
+    <a:masterClrMapping/>
+  </p:clrMapOvr>
+  <p:timing>
+    <p:tnLst>
+      <p:par>
+        <p:cTn id="1" dur="indefinite" restart="never" nodeType="tmRoot"/>
+      </p:par>
+    </p:tnLst>
+  </p:timing>
+</p:sld>
+</file>
+
+<file path=ppt/slides/slide2.xml><?xml version="1.0" encoding="utf-8"?>
+<p:sld xmlns:a="http://schemas.openxmlformats.org/drawingml/2006/main" xmlns:r="http://schemas.openxmlformats.org/officeDocument/2006/relationships" xmlns:p="http://schemas.openxmlformats.org/presentationml/2006/main">
+  <p:cSld>
+    <p:spTree>
+      <p:nvGrpSpPr>
+        <p:cNvPr id="1" name=""/>
+        <p:cNvGrpSpPr/>
+        <p:nvPr/>
+      </p:nvGrpSpPr>
+      <p:grpSpPr>
+        <a:xfrm>
+          <a:off x="0" y="0"/>
+          <a:ext cx="0" cy="0"/>
+          <a:chOff x="0" y="0"/>
+          <a:chExt cx="0" cy="0"/>
+        </a:xfrm>
+      </p:grpSpPr>
+      <p:sp>
+        <p:nvSpPr>
           <p:cNvPr id="5" name="Rectangle 4"/>
           <p:cNvSpPr/>
           <p:nvPr/>
@@ -4205,7 +5941,7 @@
 </p:sld>
 </file>
 
-<file path=ppt/slides/slide2.xml><?xml version="1.0" encoding="utf-8"?>
+<file path=ppt/slides/slide3.xml><?xml version="1.0" encoding="utf-8"?>
 <p:sld xmlns:a="http://schemas.openxmlformats.org/drawingml/2006/main" xmlns:r="http://schemas.openxmlformats.org/officeDocument/2006/relationships" xmlns:p="http://schemas.openxmlformats.org/presentationml/2006/main">
   <p:cSld>
     <p:spTree>
@@ -5122,7 +6858,7 @@
 </p:sld>
 </file>
 
-<file path=ppt/slides/slide3.xml><?xml version="1.0" encoding="utf-8"?>
+<file path=ppt/slides/slide4.xml><?xml version="1.0" encoding="utf-8"?>
 <p:sld xmlns:a="http://schemas.openxmlformats.org/drawingml/2006/main" xmlns:r="http://schemas.openxmlformats.org/officeDocument/2006/relationships" xmlns:p="http://schemas.openxmlformats.org/presentationml/2006/main">
   <p:cSld>
     <p:spTree>
@@ -5882,7 +7618,7 @@
 </p:sld>
 </file>
 
-<file path=ppt/slides/slide4.xml><?xml version="1.0" encoding="utf-8"?>
+<file path=ppt/slides/slide5.xml><?xml version="1.0" encoding="utf-8"?>
 <p:sld xmlns:a="http://schemas.openxmlformats.org/drawingml/2006/main" xmlns:r="http://schemas.openxmlformats.org/officeDocument/2006/relationships" xmlns:p="http://schemas.openxmlformats.org/presentationml/2006/main">
   <p:cSld>
     <p:spTree>

</xml_diff>